<commit_message>
Added HostRecorder (part 1)
</commit_message>
<xml_diff>
--- a/docs/images/Sources.pptx
+++ b/docs/images/Sources.pptx
@@ -17,6 +17,7 @@
     <p:sldId id="289" r:id="rId11"/>
     <p:sldId id="290" r:id="rId12"/>
     <p:sldId id="260" r:id="rId13"/>
+    <p:sldId id="291" r:id="rId14"/>
   </p:sldIdLst>
   <p:sldSz cx="12192000" cy="6858000"/>
   <p:notesSz cx="6858000" cy="9144000"/>
@@ -8726,7 +8727,7 @@
           <a:p>
             <a:fld id="{7C7C8CC2-4E43-407C-8230-EFF88652EA00}" type="datetimeFigureOut">
               <a:rPr lang="en-NZ" smtClean="0"/>
-              <a:t>11/12/2023</a:t>
+              <a:t>26/12/2023</a:t>
             </a:fld>
             <a:endParaRPr lang="en-NZ"/>
           </a:p>
@@ -8926,7 +8927,7 @@
           <a:p>
             <a:fld id="{7C7C8CC2-4E43-407C-8230-EFF88652EA00}" type="datetimeFigureOut">
               <a:rPr lang="en-NZ" smtClean="0"/>
-              <a:t>11/12/2023</a:t>
+              <a:t>26/12/2023</a:t>
             </a:fld>
             <a:endParaRPr lang="en-NZ"/>
           </a:p>
@@ -9136,7 +9137,7 @@
           <a:p>
             <a:fld id="{7C7C8CC2-4E43-407C-8230-EFF88652EA00}" type="datetimeFigureOut">
               <a:rPr lang="en-NZ" smtClean="0"/>
-              <a:t>11/12/2023</a:t>
+              <a:t>26/12/2023</a:t>
             </a:fld>
             <a:endParaRPr lang="en-NZ"/>
           </a:p>
@@ -9336,7 +9337,7 @@
           <a:p>
             <a:fld id="{7C7C8CC2-4E43-407C-8230-EFF88652EA00}" type="datetimeFigureOut">
               <a:rPr lang="en-NZ" smtClean="0"/>
-              <a:t>11/12/2023</a:t>
+              <a:t>26/12/2023</a:t>
             </a:fld>
             <a:endParaRPr lang="en-NZ"/>
           </a:p>
@@ -9612,7 +9613,7 @@
           <a:p>
             <a:fld id="{7C7C8CC2-4E43-407C-8230-EFF88652EA00}" type="datetimeFigureOut">
               <a:rPr lang="en-NZ" smtClean="0"/>
-              <a:t>11/12/2023</a:t>
+              <a:t>26/12/2023</a:t>
             </a:fld>
             <a:endParaRPr lang="en-NZ"/>
           </a:p>
@@ -9880,7 +9881,7 @@
           <a:p>
             <a:fld id="{7C7C8CC2-4E43-407C-8230-EFF88652EA00}" type="datetimeFigureOut">
               <a:rPr lang="en-NZ" smtClean="0"/>
-              <a:t>11/12/2023</a:t>
+              <a:t>26/12/2023</a:t>
             </a:fld>
             <a:endParaRPr lang="en-NZ"/>
           </a:p>
@@ -10295,7 +10296,7 @@
           <a:p>
             <a:fld id="{7C7C8CC2-4E43-407C-8230-EFF88652EA00}" type="datetimeFigureOut">
               <a:rPr lang="en-NZ" smtClean="0"/>
-              <a:t>11/12/2023</a:t>
+              <a:t>26/12/2023</a:t>
             </a:fld>
             <a:endParaRPr lang="en-NZ"/>
           </a:p>
@@ -10437,7 +10438,7 @@
           <a:p>
             <a:fld id="{7C7C8CC2-4E43-407C-8230-EFF88652EA00}" type="datetimeFigureOut">
               <a:rPr lang="en-NZ" smtClean="0"/>
-              <a:t>11/12/2023</a:t>
+              <a:t>26/12/2023</a:t>
             </a:fld>
             <a:endParaRPr lang="en-NZ"/>
           </a:p>
@@ -10550,7 +10551,7 @@
           <a:p>
             <a:fld id="{7C7C8CC2-4E43-407C-8230-EFF88652EA00}" type="datetimeFigureOut">
               <a:rPr lang="en-NZ" smtClean="0"/>
-              <a:t>11/12/2023</a:t>
+              <a:t>26/12/2023</a:t>
             </a:fld>
             <a:endParaRPr lang="en-NZ"/>
           </a:p>
@@ -10863,7 +10864,7 @@
           <a:p>
             <a:fld id="{7C7C8CC2-4E43-407C-8230-EFF88652EA00}" type="datetimeFigureOut">
               <a:rPr lang="en-NZ" smtClean="0"/>
-              <a:t>11/12/2023</a:t>
+              <a:t>26/12/2023</a:t>
             </a:fld>
             <a:endParaRPr lang="en-NZ"/>
           </a:p>
@@ -11152,7 +11153,7 @@
           <a:p>
             <a:fld id="{7C7C8CC2-4E43-407C-8230-EFF88652EA00}" type="datetimeFigureOut">
               <a:rPr lang="en-NZ" smtClean="0"/>
-              <a:t>11/12/2023</a:t>
+              <a:t>26/12/2023</a:t>
             </a:fld>
             <a:endParaRPr lang="en-NZ"/>
           </a:p>
@@ -11395,7 +11396,7 @@
           <a:p>
             <a:fld id="{7C7C8CC2-4E43-407C-8230-EFF88652EA00}" type="datetimeFigureOut">
               <a:rPr lang="en-NZ" smtClean="0"/>
-              <a:t>11/12/2023</a:t>
+              <a:t>26/12/2023</a:t>
             </a:fld>
             <a:endParaRPr lang="en-NZ"/>
           </a:p>
@@ -15296,66 +15297,6 @@
           </a:p>
         </p:txBody>
       </p:sp>
-      <p:sp>
-        <p:nvSpPr>
-          <p:cNvPr id="75" name="Scroll: Vertical 74">
-            <a:extLst>
-              <a:ext uri="{FF2B5EF4-FFF2-40B4-BE49-F238E27FC236}">
-                <a16:creationId xmlns:a16="http://schemas.microsoft.com/office/drawing/2014/main" id="{CAD8C807-F852-474E-9DCD-6C18ABBDE35E}"/>
-              </a:ext>
-            </a:extLst>
-          </p:cNvPr>
-          <p:cNvSpPr/>
-          <p:nvPr/>
-        </p:nvSpPr>
-        <p:spPr>
-          <a:xfrm rot="5400000">
-            <a:off x="3882132" y="3227408"/>
-            <a:ext cx="398326" cy="495579"/>
-          </a:xfrm>
-          <a:prstGeom prst="verticalScroll">
-            <a:avLst/>
-          </a:prstGeom>
-          <a:solidFill>
-            <a:schemeClr val="accent3">
-              <a:lumMod val="75000"/>
-            </a:schemeClr>
-          </a:solidFill>
-          <a:ln>
-            <a:solidFill>
-              <a:schemeClr val="tx1"/>
-            </a:solidFill>
-          </a:ln>
-        </p:spPr>
-        <p:style>
-          <a:lnRef idx="2">
-            <a:schemeClr val="accent1">
-              <a:shade val="50000"/>
-            </a:schemeClr>
-          </a:lnRef>
-          <a:fillRef idx="1">
-            <a:schemeClr val="accent1"/>
-          </a:fillRef>
-          <a:effectRef idx="0">
-            <a:schemeClr val="accent1"/>
-          </a:effectRef>
-          <a:fontRef idx="minor">
-            <a:schemeClr val="lt1"/>
-          </a:fontRef>
-        </p:style>
-        <p:txBody>
-          <a:bodyPr vert="vert270" rtlCol="0" anchor="ctr"/>
-          <a:lstStyle/>
-          <a:p>
-            <a:pPr algn="ctr"/>
-            <a:r>
-              <a:rPr lang="en-US" sz="1200" dirty="0"/>
-              <a:t>JWT</a:t>
-            </a:r>
-            <a:endParaRPr lang="en-NZ" sz="800" dirty="0"/>
-          </a:p>
-        </p:txBody>
-      </p:sp>
       <p:grpSp>
         <p:nvGrpSpPr>
           <p:cNvPr id="65" name="Group 64">
@@ -16431,7 +16372,7 @@
             <p:spPr>
               <a:xfrm>
                 <a:off x="8369951" y="5576118"/>
-                <a:ext cx="852979" cy="352483"/>
+                <a:ext cx="852979" cy="332901"/>
               </a:xfrm>
               <a:prstGeom prst="rect">
                 <a:avLst/>
@@ -16445,7 +16386,7 @@
               <a:lstStyle/>
               <a:p>
                 <a:r>
-                  <a:rPr lang="en-US" sz="1200" dirty="0">
+                  <a:rPr lang="en-US" sz="1100" dirty="0">
                     <a:effectLst>
                       <a:glow rad="101600">
                         <a:schemeClr val="bg1">
@@ -19311,7 +19252,15 @@
                     <a:schemeClr val="tx1"/>
                   </a:solidFill>
                 </a:rPr>
-                <a:t>Blob Storage</a:t>
+                <a:t>Blob </a:t>
+              </a:r>
+              <a:r>
+                <a:rPr lang="en-US" sz="800" dirty="0">
+                  <a:solidFill>
+                    <a:schemeClr val="tx1"/>
+                  </a:solidFill>
+                </a:rPr>
+                <a:t>Storage</a:t>
               </a:r>
               <a:endParaRPr lang="en-NZ" sz="900" dirty="0">
                 <a:solidFill>
@@ -31919,6 +31868,4402 @@
 </p:sld>
 </file>
 
+<file path=ppt/slides/slide13.xml><?xml version="1.0" encoding="utf-8"?>
+<p:sld xmlns:a="http://schemas.openxmlformats.org/drawingml/2006/main" xmlns:r="http://schemas.openxmlformats.org/officeDocument/2006/relationships" xmlns:p="http://schemas.openxmlformats.org/presentationml/2006/main">
+  <p:cSld>
+    <p:spTree>
+      <p:nvGrpSpPr>
+        <p:cNvPr id="1" name=""/>
+        <p:cNvGrpSpPr/>
+        <p:nvPr/>
+      </p:nvGrpSpPr>
+      <p:grpSpPr>
+        <a:xfrm>
+          <a:off x="0" y="0"/>
+          <a:ext cx="0" cy="0"/>
+          <a:chOff x="0" y="0"/>
+          <a:chExt cx="0" cy="0"/>
+        </a:xfrm>
+      </p:grpSpPr>
+      <p:grpSp>
+        <p:nvGrpSpPr>
+          <p:cNvPr id="172" name="Group 171">
+            <a:extLst>
+              <a:ext uri="{FF2B5EF4-FFF2-40B4-BE49-F238E27FC236}">
+                <a16:creationId xmlns:a16="http://schemas.microsoft.com/office/drawing/2014/main" id="{1C7F2652-6D33-ACBE-4279-5885196CE906}"/>
+              </a:ext>
+            </a:extLst>
+          </p:cNvPr>
+          <p:cNvGrpSpPr/>
+          <p:nvPr/>
+        </p:nvGrpSpPr>
+        <p:grpSpPr>
+          <a:xfrm>
+            <a:off x="9194001" y="1842282"/>
+            <a:ext cx="1932705" cy="409284"/>
+            <a:chOff x="9194001" y="2086730"/>
+            <a:chExt cx="1932705" cy="409284"/>
+          </a:xfrm>
+        </p:grpSpPr>
+        <p:sp>
+          <p:nvSpPr>
+            <p:cNvPr id="2" name="Rectangle 1">
+              <a:extLst>
+                <a:ext uri="{FF2B5EF4-FFF2-40B4-BE49-F238E27FC236}">
+                  <a16:creationId xmlns:a16="http://schemas.microsoft.com/office/drawing/2014/main" id="{E76BDB9F-0119-D883-61AA-E4CAEB426C5B}"/>
+                </a:ext>
+              </a:extLst>
+            </p:cNvPr>
+            <p:cNvSpPr/>
+            <p:nvPr/>
+          </p:nvSpPr>
+          <p:spPr>
+            <a:xfrm>
+              <a:off x="9194001" y="2086730"/>
+              <a:ext cx="1932705" cy="409284"/>
+            </a:xfrm>
+            <a:prstGeom prst="rect">
+              <a:avLst/>
+            </a:prstGeom>
+            <a:solidFill>
+              <a:schemeClr val="bg1">
+                <a:lumMod val="85000"/>
+              </a:schemeClr>
+            </a:solidFill>
+            <a:ln>
+              <a:solidFill>
+                <a:schemeClr val="bg1">
+                  <a:lumMod val="65000"/>
+                </a:schemeClr>
+              </a:solidFill>
+            </a:ln>
+          </p:spPr>
+          <p:style>
+            <a:lnRef idx="2">
+              <a:schemeClr val="accent1">
+                <a:shade val="15000"/>
+              </a:schemeClr>
+            </a:lnRef>
+            <a:fillRef idx="1">
+              <a:schemeClr val="accent1"/>
+            </a:fillRef>
+            <a:effectRef idx="0">
+              <a:schemeClr val="accent1"/>
+            </a:effectRef>
+            <a:fontRef idx="minor">
+              <a:schemeClr val="lt1"/>
+            </a:fontRef>
+          </p:style>
+          <p:txBody>
+            <a:bodyPr rtlCol="0" anchor="ctr"/>
+            <a:lstStyle/>
+            <a:p>
+              <a:pPr algn="r"/>
+              <a:r>
+                <a:rPr lang="en-NZ" dirty="0">
+                  <a:solidFill>
+                    <a:schemeClr val="bg2">
+                      <a:lumMod val="75000"/>
+                    </a:schemeClr>
+                  </a:solidFill>
+                </a:rPr>
+                <a:t>APMs</a:t>
+              </a:r>
+            </a:p>
+          </p:txBody>
+        </p:sp>
+        <p:grpSp>
+          <p:nvGrpSpPr>
+            <p:cNvPr id="75" name="Group 74">
+              <a:extLst>
+                <a:ext uri="{FF2B5EF4-FFF2-40B4-BE49-F238E27FC236}">
+                  <a16:creationId xmlns:a16="http://schemas.microsoft.com/office/drawing/2014/main" id="{7BEA45FC-C58D-C0BC-18EC-A5381EFEA24D}"/>
+                </a:ext>
+              </a:extLst>
+            </p:cNvPr>
+            <p:cNvGrpSpPr/>
+            <p:nvPr/>
+          </p:nvGrpSpPr>
+          <p:grpSpPr>
+            <a:xfrm>
+              <a:off x="9304337" y="2132396"/>
+              <a:ext cx="1058195" cy="319189"/>
+              <a:chOff x="1484389" y="5783642"/>
+              <a:chExt cx="2243283" cy="442298"/>
+            </a:xfrm>
+          </p:grpSpPr>
+          <p:sp>
+            <p:nvSpPr>
+              <p:cNvPr id="76" name="Rectangle: Rounded Corners 75">
+                <a:extLst>
+                  <a:ext uri="{FF2B5EF4-FFF2-40B4-BE49-F238E27FC236}">
+                    <a16:creationId xmlns:a16="http://schemas.microsoft.com/office/drawing/2014/main" id="{5732F1FF-9F02-4057-799C-CC21FE4A2E66}"/>
+                  </a:ext>
+                </a:extLst>
+              </p:cNvPr>
+              <p:cNvSpPr/>
+              <p:nvPr/>
+            </p:nvSpPr>
+            <p:spPr>
+              <a:xfrm>
+                <a:off x="1484389" y="5783642"/>
+                <a:ext cx="2243283" cy="442298"/>
+              </a:xfrm>
+              <a:prstGeom prst="roundRect">
+                <a:avLst>
+                  <a:gd name="adj" fmla="val 4751"/>
+                </a:avLst>
+              </a:prstGeom>
+              <a:solidFill>
+                <a:srgbClr val="651F74"/>
+              </a:solidFill>
+              <a:ln>
+                <a:solidFill>
+                  <a:srgbClr val="002060"/>
+                </a:solidFill>
+              </a:ln>
+            </p:spPr>
+            <p:style>
+              <a:lnRef idx="2">
+                <a:schemeClr val="accent1">
+                  <a:shade val="50000"/>
+                </a:schemeClr>
+              </a:lnRef>
+              <a:fillRef idx="1">
+                <a:schemeClr val="accent1"/>
+              </a:fillRef>
+              <a:effectRef idx="0">
+                <a:schemeClr val="accent1"/>
+              </a:effectRef>
+              <a:fontRef idx="minor">
+                <a:schemeClr val="lt1"/>
+              </a:fontRef>
+            </p:style>
+            <p:txBody>
+              <a:bodyPr rtlCol="0" anchor="ctr"/>
+              <a:lstStyle/>
+              <a:p>
+                <a:pPr algn="r"/>
+                <a:r>
+                  <a:rPr lang="en-NZ" sz="1100" dirty="0"/>
+                  <a:t>App Insights </a:t>
+                </a:r>
+              </a:p>
+            </p:txBody>
+          </p:sp>
+          <p:pic>
+            <p:nvPicPr>
+              <p:cNvPr id="77" name="Picture 76">
+                <a:extLst>
+                  <a:ext uri="{FF2B5EF4-FFF2-40B4-BE49-F238E27FC236}">
+                    <a16:creationId xmlns:a16="http://schemas.microsoft.com/office/drawing/2014/main" id="{31EC86E0-B93D-42D6-C8BC-74A0E968AD9D}"/>
+                  </a:ext>
+                </a:extLst>
+              </p:cNvPr>
+              <p:cNvPicPr>
+                <a:picLocks noChangeAspect="1"/>
+              </p:cNvPicPr>
+              <p:nvPr/>
+            </p:nvPicPr>
+            <p:blipFill>
+              <a:blip r:embed="rId2"/>
+              <a:stretch>
+                <a:fillRect/>
+              </a:stretch>
+            </p:blipFill>
+            <p:spPr>
+              <a:xfrm>
+                <a:off x="1581685" y="5883792"/>
+                <a:ext cx="290502" cy="240278"/>
+              </a:xfrm>
+              <a:prstGeom prst="rect">
+                <a:avLst/>
+              </a:prstGeom>
+            </p:spPr>
+          </p:pic>
+        </p:grpSp>
+      </p:grpSp>
+      <p:cxnSp>
+        <p:nvCxnSpPr>
+          <p:cNvPr id="272" name="Straight Arrow Connector 29">
+            <a:extLst>
+              <a:ext uri="{FF2B5EF4-FFF2-40B4-BE49-F238E27FC236}">
+                <a16:creationId xmlns:a16="http://schemas.microsoft.com/office/drawing/2014/main" id="{F9CA8899-94F1-BFAC-107C-53B404DBA8C2}"/>
+              </a:ext>
+            </a:extLst>
+          </p:cNvPr>
+          <p:cNvCxnSpPr>
+            <a:cxnSpLocks/>
+            <a:stCxn id="76" idx="0"/>
+            <a:endCxn id="263" idx="3"/>
+          </p:cNvCxnSpPr>
+          <p:nvPr/>
+        </p:nvCxnSpPr>
+        <p:spPr>
+          <a:xfrm flipH="1" flipV="1">
+            <a:off x="8347324" y="1587836"/>
+            <a:ext cx="1486111" cy="300112"/>
+          </a:xfrm>
+          <a:prstGeom prst="straightConnector1">
+            <a:avLst/>
+          </a:prstGeom>
+          <a:ln w="12700" cap="flat" cmpd="sng" algn="ctr">
+            <a:solidFill>
+              <a:srgbClr val="7030A0"/>
+            </a:solidFill>
+            <a:prstDash val="sysDot"/>
+            <a:round/>
+            <a:headEnd type="arrow" w="med" len="med"/>
+            <a:tailEnd type="none" w="med" len="med"/>
+          </a:ln>
+        </p:spPr>
+        <p:style>
+          <a:lnRef idx="0">
+            <a:scrgbClr r="0" g="0" b="0"/>
+          </a:lnRef>
+          <a:fillRef idx="0">
+            <a:scrgbClr r="0" g="0" b="0"/>
+          </a:fillRef>
+          <a:effectRef idx="0">
+            <a:scrgbClr r="0" g="0" b="0"/>
+          </a:effectRef>
+          <a:fontRef idx="minor">
+            <a:schemeClr val="tx1"/>
+          </a:fontRef>
+        </p:style>
+      </p:cxnSp>
+      <p:cxnSp>
+        <p:nvCxnSpPr>
+          <p:cNvPr id="3" name="Straight Arrow Connector 29">
+            <a:extLst>
+              <a:ext uri="{FF2B5EF4-FFF2-40B4-BE49-F238E27FC236}">
+                <a16:creationId xmlns:a16="http://schemas.microsoft.com/office/drawing/2014/main" id="{4F6BB14F-4BE4-0377-B76F-C48DBAB4D20A}"/>
+              </a:ext>
+            </a:extLst>
+          </p:cNvPr>
+          <p:cNvCxnSpPr>
+            <a:cxnSpLocks/>
+            <a:stCxn id="76" idx="2"/>
+            <a:endCxn id="35" idx="2"/>
+          </p:cNvCxnSpPr>
+          <p:nvPr/>
+        </p:nvCxnSpPr>
+        <p:spPr>
+          <a:xfrm flipH="1">
+            <a:off x="9517508" y="2207137"/>
+            <a:ext cx="315927" cy="812925"/>
+          </a:xfrm>
+          <a:prstGeom prst="straightConnector1">
+            <a:avLst/>
+          </a:prstGeom>
+          <a:ln w="12700" cap="flat" cmpd="sng" algn="ctr">
+            <a:solidFill>
+              <a:srgbClr val="7030A0"/>
+            </a:solidFill>
+            <a:prstDash val="sysDot"/>
+            <a:round/>
+            <a:headEnd type="arrow" w="med" len="med"/>
+            <a:tailEnd type="none" w="med" len="med"/>
+          </a:ln>
+        </p:spPr>
+        <p:style>
+          <a:lnRef idx="0">
+            <a:scrgbClr r="0" g="0" b="0"/>
+          </a:lnRef>
+          <a:fillRef idx="0">
+            <a:scrgbClr r="0" g="0" b="0"/>
+          </a:fillRef>
+          <a:effectRef idx="0">
+            <a:scrgbClr r="0" g="0" b="0"/>
+          </a:effectRef>
+          <a:fontRef idx="minor">
+            <a:schemeClr val="tx1"/>
+          </a:fontRef>
+        </p:style>
+      </p:cxnSp>
+      <p:cxnSp>
+        <p:nvCxnSpPr>
+          <p:cNvPr id="7" name="Straight Arrow Connector 29">
+            <a:extLst>
+              <a:ext uri="{FF2B5EF4-FFF2-40B4-BE49-F238E27FC236}">
+                <a16:creationId xmlns:a16="http://schemas.microsoft.com/office/drawing/2014/main" id="{F7F8DC36-AEE5-4611-8D60-043846A24226}"/>
+              </a:ext>
+            </a:extLst>
+          </p:cNvPr>
+          <p:cNvCxnSpPr>
+            <a:cxnSpLocks/>
+            <a:stCxn id="76" idx="2"/>
+            <a:endCxn id="66" idx="0"/>
+          </p:cNvCxnSpPr>
+          <p:nvPr/>
+        </p:nvCxnSpPr>
+        <p:spPr>
+          <a:xfrm>
+            <a:off x="9833435" y="2207137"/>
+            <a:ext cx="805269" cy="812923"/>
+          </a:xfrm>
+          <a:prstGeom prst="straightConnector1">
+            <a:avLst/>
+          </a:prstGeom>
+          <a:ln w="12700" cap="flat" cmpd="sng" algn="ctr">
+            <a:solidFill>
+              <a:srgbClr val="7030A0"/>
+            </a:solidFill>
+            <a:prstDash val="sysDot"/>
+            <a:round/>
+            <a:headEnd type="arrow" w="med" len="med"/>
+            <a:tailEnd type="none" w="med" len="med"/>
+          </a:ln>
+        </p:spPr>
+        <p:style>
+          <a:lnRef idx="0">
+            <a:scrgbClr r="0" g="0" b="0"/>
+          </a:lnRef>
+          <a:fillRef idx="0">
+            <a:scrgbClr r="0" g="0" b="0"/>
+          </a:fillRef>
+          <a:effectRef idx="0">
+            <a:scrgbClr r="0" g="0" b="0"/>
+          </a:effectRef>
+          <a:fontRef idx="minor">
+            <a:schemeClr val="tx1"/>
+          </a:fontRef>
+        </p:style>
+      </p:cxnSp>
+      <p:cxnSp>
+        <p:nvCxnSpPr>
+          <p:cNvPr id="148" name="Straight Arrow Connector 29">
+            <a:extLst>
+              <a:ext uri="{FF2B5EF4-FFF2-40B4-BE49-F238E27FC236}">
+                <a16:creationId xmlns:a16="http://schemas.microsoft.com/office/drawing/2014/main" id="{B2A3FE83-40C4-4276-3E0C-740512E57162}"/>
+              </a:ext>
+            </a:extLst>
+          </p:cNvPr>
+          <p:cNvCxnSpPr>
+            <a:cxnSpLocks/>
+            <a:stCxn id="76" idx="2"/>
+            <a:endCxn id="47" idx="3"/>
+          </p:cNvCxnSpPr>
+          <p:nvPr/>
+        </p:nvCxnSpPr>
+        <p:spPr>
+          <a:xfrm flipH="1">
+            <a:off x="8359008" y="2207137"/>
+            <a:ext cx="1474427" cy="3026193"/>
+          </a:xfrm>
+          <a:prstGeom prst="straightConnector1">
+            <a:avLst/>
+          </a:prstGeom>
+          <a:ln w="12700" cap="flat" cmpd="sng" algn="ctr">
+            <a:solidFill>
+              <a:srgbClr val="7030A0"/>
+            </a:solidFill>
+            <a:prstDash val="sysDot"/>
+            <a:round/>
+            <a:headEnd type="arrow" w="med" len="med"/>
+            <a:tailEnd type="none" w="med" len="med"/>
+          </a:ln>
+        </p:spPr>
+        <p:style>
+          <a:lnRef idx="0">
+            <a:scrgbClr r="0" g="0" b="0"/>
+          </a:lnRef>
+          <a:fillRef idx="0">
+            <a:scrgbClr r="0" g="0" b="0"/>
+          </a:fillRef>
+          <a:effectRef idx="0">
+            <a:scrgbClr r="0" g="0" b="0"/>
+          </a:effectRef>
+          <a:fontRef idx="minor">
+            <a:schemeClr val="tx1"/>
+          </a:fontRef>
+        </p:style>
+      </p:cxnSp>
+      <p:cxnSp>
+        <p:nvCxnSpPr>
+          <p:cNvPr id="249" name="Straight Arrow Connector 29">
+            <a:extLst>
+              <a:ext uri="{FF2B5EF4-FFF2-40B4-BE49-F238E27FC236}">
+                <a16:creationId xmlns:a16="http://schemas.microsoft.com/office/drawing/2014/main" id="{8D7F3878-1E8C-BB8D-AD03-033B207562F5}"/>
+              </a:ext>
+            </a:extLst>
+          </p:cNvPr>
+          <p:cNvCxnSpPr>
+            <a:cxnSpLocks/>
+            <a:stCxn id="76" idx="2"/>
+            <a:endCxn id="178" idx="3"/>
+          </p:cNvCxnSpPr>
+          <p:nvPr/>
+        </p:nvCxnSpPr>
+        <p:spPr>
+          <a:xfrm flipH="1">
+            <a:off x="8359008" y="2207137"/>
+            <a:ext cx="1474427" cy="1095372"/>
+          </a:xfrm>
+          <a:prstGeom prst="straightConnector1">
+            <a:avLst/>
+          </a:prstGeom>
+          <a:ln w="12700" cap="flat" cmpd="sng" algn="ctr">
+            <a:solidFill>
+              <a:srgbClr val="7030A0"/>
+            </a:solidFill>
+            <a:prstDash val="sysDot"/>
+            <a:round/>
+            <a:headEnd type="arrow" w="med" len="med"/>
+            <a:tailEnd type="none" w="med" len="med"/>
+          </a:ln>
+        </p:spPr>
+        <p:style>
+          <a:lnRef idx="0">
+            <a:scrgbClr r="0" g="0" b="0"/>
+          </a:lnRef>
+          <a:fillRef idx="0">
+            <a:scrgbClr r="0" g="0" b="0"/>
+          </a:fillRef>
+          <a:effectRef idx="0">
+            <a:scrgbClr r="0" g="0" b="0"/>
+          </a:effectRef>
+          <a:fontRef idx="minor">
+            <a:schemeClr val="tx1"/>
+          </a:fontRef>
+        </p:style>
+      </p:cxnSp>
+      <p:grpSp>
+        <p:nvGrpSpPr>
+          <p:cNvPr id="156" name="Group 155">
+            <a:extLst>
+              <a:ext uri="{FF2B5EF4-FFF2-40B4-BE49-F238E27FC236}">
+                <a16:creationId xmlns:a16="http://schemas.microsoft.com/office/drawing/2014/main" id="{19F9D48E-E98F-1F73-D305-C85697A29063}"/>
+              </a:ext>
+            </a:extLst>
+          </p:cNvPr>
+          <p:cNvGrpSpPr/>
+          <p:nvPr/>
+        </p:nvGrpSpPr>
+        <p:grpSpPr>
+          <a:xfrm>
+            <a:off x="2073581" y="927591"/>
+            <a:ext cx="1242482" cy="1325733"/>
+            <a:chOff x="588817" y="995618"/>
+            <a:chExt cx="1242482" cy="1325733"/>
+          </a:xfrm>
+        </p:grpSpPr>
+        <p:sp>
+          <p:nvSpPr>
+            <p:cNvPr id="16" name="Oval 15">
+              <a:extLst>
+                <a:ext uri="{FF2B5EF4-FFF2-40B4-BE49-F238E27FC236}">
+                  <a16:creationId xmlns:a16="http://schemas.microsoft.com/office/drawing/2014/main" id="{1858398B-CA17-CB5B-882A-CE05FB82F292}"/>
+                </a:ext>
+              </a:extLst>
+            </p:cNvPr>
+            <p:cNvSpPr/>
+            <p:nvPr/>
+          </p:nvSpPr>
+          <p:spPr>
+            <a:xfrm>
+              <a:off x="1367978" y="2076136"/>
+              <a:ext cx="145579" cy="145579"/>
+            </a:xfrm>
+            <a:prstGeom prst="ellipse">
+              <a:avLst/>
+            </a:prstGeom>
+          </p:spPr>
+          <p:style>
+            <a:lnRef idx="2">
+              <a:schemeClr val="accent1">
+                <a:shade val="50000"/>
+              </a:schemeClr>
+            </a:lnRef>
+            <a:fillRef idx="1">
+              <a:schemeClr val="accent1"/>
+            </a:fillRef>
+            <a:effectRef idx="0">
+              <a:schemeClr val="accent1"/>
+            </a:effectRef>
+            <a:fontRef idx="minor">
+              <a:schemeClr val="lt1"/>
+            </a:fontRef>
+          </p:style>
+          <p:txBody>
+            <a:bodyPr rtlCol="0" anchor="ctr"/>
+            <a:lstStyle/>
+            <a:p>
+              <a:pPr algn="ctr"/>
+              <a:endParaRPr lang="en-NZ" sz="1200"/>
+            </a:p>
+          </p:txBody>
+        </p:sp>
+        <p:sp>
+          <p:nvSpPr>
+            <p:cNvPr id="17" name="Oval 16">
+              <a:extLst>
+                <a:ext uri="{FF2B5EF4-FFF2-40B4-BE49-F238E27FC236}">
+                  <a16:creationId xmlns:a16="http://schemas.microsoft.com/office/drawing/2014/main" id="{A37AF17B-B9EC-C0EE-C317-4BE4B731795E}"/>
+                </a:ext>
+              </a:extLst>
+            </p:cNvPr>
+            <p:cNvSpPr/>
+            <p:nvPr/>
+          </p:nvSpPr>
+          <p:spPr>
+            <a:xfrm>
+              <a:off x="885968" y="2067931"/>
+              <a:ext cx="145579" cy="145579"/>
+            </a:xfrm>
+            <a:prstGeom prst="ellipse">
+              <a:avLst/>
+            </a:prstGeom>
+          </p:spPr>
+          <p:style>
+            <a:lnRef idx="2">
+              <a:schemeClr val="accent1">
+                <a:shade val="50000"/>
+              </a:schemeClr>
+            </a:lnRef>
+            <a:fillRef idx="1">
+              <a:schemeClr val="accent1"/>
+            </a:fillRef>
+            <a:effectRef idx="0">
+              <a:schemeClr val="accent1"/>
+            </a:effectRef>
+            <a:fontRef idx="minor">
+              <a:schemeClr val="lt1"/>
+            </a:fontRef>
+          </p:style>
+          <p:txBody>
+            <a:bodyPr rtlCol="0" anchor="ctr"/>
+            <a:lstStyle/>
+            <a:p>
+              <a:pPr algn="ctr"/>
+              <a:endParaRPr lang="en-NZ" sz="1200"/>
+            </a:p>
+          </p:txBody>
+        </p:sp>
+        <p:sp>
+          <p:nvSpPr>
+            <p:cNvPr id="18" name="Rectangle: Rounded Corners 17">
+              <a:extLst>
+                <a:ext uri="{FF2B5EF4-FFF2-40B4-BE49-F238E27FC236}">
+                  <a16:creationId xmlns:a16="http://schemas.microsoft.com/office/drawing/2014/main" id="{2AA576C4-7E7E-29B3-0DD3-182E82CF2A1A}"/>
+                </a:ext>
+              </a:extLst>
+            </p:cNvPr>
+            <p:cNvSpPr/>
+            <p:nvPr/>
+          </p:nvSpPr>
+          <p:spPr>
+            <a:xfrm>
+              <a:off x="588818" y="995618"/>
+              <a:ext cx="1242481" cy="1325733"/>
+            </a:xfrm>
+            <a:prstGeom prst="roundRect">
+              <a:avLst>
+                <a:gd name="adj" fmla="val 0"/>
+              </a:avLst>
+            </a:prstGeom>
+            <a:solidFill>
+              <a:schemeClr val="bg2">
+                <a:lumMod val="90000"/>
+              </a:schemeClr>
+            </a:solidFill>
+          </p:spPr>
+          <p:style>
+            <a:lnRef idx="2">
+              <a:schemeClr val="accent1">
+                <a:shade val="50000"/>
+              </a:schemeClr>
+            </a:lnRef>
+            <a:fillRef idx="1">
+              <a:schemeClr val="accent1"/>
+            </a:fillRef>
+            <a:effectRef idx="0">
+              <a:schemeClr val="accent1"/>
+            </a:effectRef>
+            <a:fontRef idx="minor">
+              <a:schemeClr val="lt1"/>
+            </a:fontRef>
+          </p:style>
+          <p:txBody>
+            <a:bodyPr rtlCol="0" anchor="t"/>
+            <a:lstStyle/>
+            <a:p>
+              <a:pPr algn="ctr"/>
+              <a:r>
+                <a:rPr lang="en-US" sz="1200" dirty="0">
+                  <a:solidFill>
+                    <a:schemeClr val="tx1"/>
+                  </a:solidFill>
+                </a:rPr>
+                <a:t>Web</a:t>
+              </a:r>
+              <a:br>
+                <a:rPr lang="en-US" sz="1200" dirty="0">
+                  <a:solidFill>
+                    <a:schemeClr val="tx1"/>
+                  </a:solidFill>
+                </a:rPr>
+              </a:br>
+              <a:r>
+                <a:rPr lang="en-US" sz="1200" dirty="0">
+                  <a:solidFill>
+                    <a:schemeClr val="tx1"/>
+                  </a:solidFill>
+                </a:rPr>
+                <a:t>Browsers</a:t>
+              </a:r>
+              <a:endParaRPr lang="en-NZ" sz="1200" dirty="0">
+                <a:solidFill>
+                  <a:schemeClr val="tx1"/>
+                </a:solidFill>
+              </a:endParaRPr>
+            </a:p>
+          </p:txBody>
+        </p:sp>
+        <p:sp>
+          <p:nvSpPr>
+            <p:cNvPr id="20" name="TextBox 19">
+              <a:extLst>
+                <a:ext uri="{FF2B5EF4-FFF2-40B4-BE49-F238E27FC236}">
+                  <a16:creationId xmlns:a16="http://schemas.microsoft.com/office/drawing/2014/main" id="{049E817D-D598-318A-6BBE-987C6DECE258}"/>
+                </a:ext>
+              </a:extLst>
+            </p:cNvPr>
+            <p:cNvSpPr txBox="1"/>
+            <p:nvPr/>
+          </p:nvSpPr>
+          <p:spPr>
+            <a:xfrm>
+              <a:off x="588817" y="2057030"/>
+              <a:ext cx="1228323" cy="230832"/>
+            </a:xfrm>
+            <a:prstGeom prst="rect">
+              <a:avLst/>
+            </a:prstGeom>
+            <a:noFill/>
+          </p:spPr>
+          <p:txBody>
+            <a:bodyPr wrap="square" rtlCol="0">
+              <a:spAutoFit/>
+            </a:bodyPr>
+            <a:lstStyle/>
+            <a:p>
+              <a:pPr algn="r"/>
+              <a:r>
+                <a:rPr lang="en-US" sz="900" dirty="0">
+                  <a:solidFill>
+                    <a:schemeClr val="bg2">
+                      <a:lumMod val="50000"/>
+                    </a:schemeClr>
+                  </a:solidFill>
+                </a:rPr>
+                <a:t>Chrome,  Firefox, </a:t>
+              </a:r>
+              <a:r>
+                <a:rPr lang="en-US" sz="900" dirty="0" err="1">
+                  <a:solidFill>
+                    <a:schemeClr val="bg2">
+                      <a:lumMod val="50000"/>
+                    </a:schemeClr>
+                  </a:solidFill>
+                </a:rPr>
+                <a:t>etc</a:t>
+              </a:r>
+              <a:endParaRPr lang="en-NZ" sz="900" dirty="0">
+                <a:solidFill>
+                  <a:schemeClr val="bg2">
+                    <a:lumMod val="50000"/>
+                  </a:schemeClr>
+                </a:solidFill>
+              </a:endParaRPr>
+            </a:p>
+          </p:txBody>
+        </p:sp>
+        <p:grpSp>
+          <p:nvGrpSpPr>
+            <p:cNvPr id="155" name="Group 154">
+              <a:extLst>
+                <a:ext uri="{FF2B5EF4-FFF2-40B4-BE49-F238E27FC236}">
+                  <a16:creationId xmlns:a16="http://schemas.microsoft.com/office/drawing/2014/main" id="{CEC3D6FA-CFD7-DE60-DEA6-DCF6F6C136B6}"/>
+                </a:ext>
+              </a:extLst>
+            </p:cNvPr>
+            <p:cNvGrpSpPr/>
+            <p:nvPr/>
+          </p:nvGrpSpPr>
+          <p:grpSpPr>
+            <a:xfrm>
+              <a:off x="789067" y="1404142"/>
+              <a:ext cx="857947" cy="619153"/>
+              <a:chOff x="789067" y="1612369"/>
+              <a:chExt cx="857947" cy="619153"/>
+            </a:xfrm>
+          </p:grpSpPr>
+          <p:sp>
+            <p:nvSpPr>
+              <p:cNvPr id="19" name="Rectangle: Rounded Corners 18">
+                <a:extLst>
+                  <a:ext uri="{FF2B5EF4-FFF2-40B4-BE49-F238E27FC236}">
+                    <a16:creationId xmlns:a16="http://schemas.microsoft.com/office/drawing/2014/main" id="{FC521CA0-7870-F423-1017-DF185DF6BF6F}"/>
+                  </a:ext>
+                </a:extLst>
+              </p:cNvPr>
+              <p:cNvSpPr/>
+              <p:nvPr/>
+            </p:nvSpPr>
+            <p:spPr>
+              <a:xfrm>
+                <a:off x="789067" y="1612369"/>
+                <a:ext cx="857947" cy="619153"/>
+              </a:xfrm>
+              <a:prstGeom prst="roundRect">
+                <a:avLst>
+                  <a:gd name="adj" fmla="val 9701"/>
+                </a:avLst>
+              </a:prstGeom>
+              <a:solidFill>
+                <a:srgbClr val="2B2C2F"/>
+              </a:solidFill>
+            </p:spPr>
+            <p:style>
+              <a:lnRef idx="2">
+                <a:schemeClr val="accent1">
+                  <a:shade val="50000"/>
+                </a:schemeClr>
+              </a:lnRef>
+              <a:fillRef idx="1">
+                <a:schemeClr val="accent1"/>
+              </a:fillRef>
+              <a:effectRef idx="0">
+                <a:schemeClr val="accent1"/>
+              </a:effectRef>
+              <a:fontRef idx="minor">
+                <a:schemeClr val="lt1"/>
+              </a:fontRef>
+            </p:style>
+            <p:txBody>
+              <a:bodyPr rtlCol="0" anchor="ctr"/>
+              <a:lstStyle/>
+              <a:p>
+                <a:pPr algn="ctr"/>
+                <a:endParaRPr lang="en-NZ" sz="1200" dirty="0"/>
+              </a:p>
+            </p:txBody>
+          </p:sp>
+          <p:pic>
+            <p:nvPicPr>
+              <p:cNvPr id="21" name="Picture 6" descr="What is React JS? | Ironhack Blog">
+                <a:extLst>
+                  <a:ext uri="{FF2B5EF4-FFF2-40B4-BE49-F238E27FC236}">
+                    <a16:creationId xmlns:a16="http://schemas.microsoft.com/office/drawing/2014/main" id="{3018FAF2-E35D-16F9-6528-07508791B48B}"/>
+                  </a:ext>
+                </a:extLst>
+              </p:cNvPr>
+              <p:cNvPicPr>
+                <a:picLocks noChangeAspect="1" noChangeArrowheads="1"/>
+              </p:cNvPicPr>
+              <p:nvPr/>
+            </p:nvPicPr>
+            <p:blipFill>
+              <a:blip r:embed="rId3">
+                <a:extLst>
+                  <a:ext uri="{28A0092B-C50C-407E-A947-70E740481C1C}">
+                    <a14:useLocalDpi xmlns:a14="http://schemas.microsoft.com/office/drawing/2010/main" val="0"/>
+                  </a:ext>
+                </a:extLst>
+              </a:blip>
+              <a:srcRect/>
+              <a:stretch>
+                <a:fillRect/>
+              </a:stretch>
+            </p:blipFill>
+            <p:spPr bwMode="auto">
+              <a:xfrm>
+                <a:off x="866679" y="1776909"/>
+                <a:ext cx="725292" cy="303076"/>
+              </a:xfrm>
+              <a:prstGeom prst="rect">
+                <a:avLst/>
+              </a:prstGeom>
+              <a:noFill/>
+              <a:extLst>
+                <a:ext uri="{909E8E84-426E-40DD-AFC4-6F175D3DCCD1}">
+                  <a14:hiddenFill xmlns:a14="http://schemas.microsoft.com/office/drawing/2010/main">
+                    <a:solidFill>
+                      <a:srgbClr val="FFFFFF"/>
+                    </a:solidFill>
+                  </a14:hiddenFill>
+                </a:ext>
+              </a:extLst>
+            </p:spPr>
+          </p:pic>
+        </p:grpSp>
+      </p:grpSp>
+      <p:sp>
+        <p:nvSpPr>
+          <p:cNvPr id="64" name="TextBox 63">
+            <a:extLst>
+              <a:ext uri="{FF2B5EF4-FFF2-40B4-BE49-F238E27FC236}">
+                <a16:creationId xmlns:a16="http://schemas.microsoft.com/office/drawing/2014/main" id="{3E38B9E1-E382-5B93-B33E-C502F12761B6}"/>
+              </a:ext>
+            </a:extLst>
+          </p:cNvPr>
+          <p:cNvSpPr txBox="1"/>
+          <p:nvPr/>
+        </p:nvSpPr>
+        <p:spPr>
+          <a:xfrm>
+            <a:off x="8802992" y="3454577"/>
+            <a:ext cx="1098378" cy="246221"/>
+          </a:xfrm>
+          <a:prstGeom prst="rect">
+            <a:avLst/>
+          </a:prstGeom>
+          <a:noFill/>
+        </p:spPr>
+        <p:txBody>
+          <a:bodyPr wrap="none" rtlCol="0">
+            <a:spAutoFit/>
+          </a:bodyPr>
+          <a:lstStyle/>
+          <a:p>
+            <a:r>
+              <a:rPr lang="en-NZ" sz="1000" dirty="0"/>
+              <a:t>+Audits/Usages</a:t>
+            </a:r>
+          </a:p>
+        </p:txBody>
+      </p:sp>
+      <p:grpSp>
+        <p:nvGrpSpPr>
+          <p:cNvPr id="193" name="Group 192">
+            <a:extLst>
+              <a:ext uri="{FF2B5EF4-FFF2-40B4-BE49-F238E27FC236}">
+                <a16:creationId xmlns:a16="http://schemas.microsoft.com/office/drawing/2014/main" id="{805B6A06-F369-AF13-2C33-3F6063A377E3}"/>
+              </a:ext>
+            </a:extLst>
+          </p:cNvPr>
+          <p:cNvGrpSpPr/>
+          <p:nvPr/>
+        </p:nvGrpSpPr>
+        <p:grpSpPr>
+          <a:xfrm>
+            <a:off x="8887040" y="3013205"/>
+            <a:ext cx="2231314" cy="406788"/>
+            <a:chOff x="8781059" y="4344282"/>
+            <a:chExt cx="2231314" cy="406788"/>
+          </a:xfrm>
+        </p:grpSpPr>
+        <p:grpSp>
+          <p:nvGrpSpPr>
+            <p:cNvPr id="30" name="Group 29">
+              <a:extLst>
+                <a:ext uri="{FF2B5EF4-FFF2-40B4-BE49-F238E27FC236}">
+                  <a16:creationId xmlns:a16="http://schemas.microsoft.com/office/drawing/2014/main" id="{BA374FF3-90B5-7BC0-FEA1-4627E37C7C86}"/>
+                </a:ext>
+              </a:extLst>
+            </p:cNvPr>
+            <p:cNvGrpSpPr/>
+            <p:nvPr/>
+          </p:nvGrpSpPr>
+          <p:grpSpPr>
+            <a:xfrm>
+              <a:off x="8781059" y="4344282"/>
+              <a:ext cx="1242435" cy="406788"/>
+              <a:chOff x="7156883" y="5814395"/>
+              <a:chExt cx="1591766" cy="517641"/>
+            </a:xfrm>
+          </p:grpSpPr>
+          <p:grpSp>
+            <p:nvGrpSpPr>
+              <p:cNvPr id="31" name="Group 30">
+                <a:extLst>
+                  <a:ext uri="{FF2B5EF4-FFF2-40B4-BE49-F238E27FC236}">
+                    <a16:creationId xmlns:a16="http://schemas.microsoft.com/office/drawing/2014/main" id="{D8D2D9CC-F26E-2614-4B97-B5A29C3C3CA8}"/>
+                  </a:ext>
+                </a:extLst>
+              </p:cNvPr>
+              <p:cNvGrpSpPr/>
+              <p:nvPr/>
+            </p:nvGrpSpPr>
+            <p:grpSpPr>
+              <a:xfrm>
+                <a:off x="7156883" y="5814395"/>
+                <a:ext cx="1591766" cy="517641"/>
+                <a:chOff x="7656619" y="5506371"/>
+                <a:chExt cx="1591766" cy="517641"/>
+              </a:xfrm>
+            </p:grpSpPr>
+            <p:sp>
+              <p:nvSpPr>
+                <p:cNvPr id="33" name="Cylinder 32">
+                  <a:extLst>
+                    <a:ext uri="{FF2B5EF4-FFF2-40B4-BE49-F238E27FC236}">
+                      <a16:creationId xmlns:a16="http://schemas.microsoft.com/office/drawing/2014/main" id="{A43604E1-8CE8-84BE-6853-11071738B1E9}"/>
+                    </a:ext>
+                  </a:extLst>
+                </p:cNvPr>
+                <p:cNvSpPr/>
+                <p:nvPr/>
+              </p:nvSpPr>
+              <p:spPr>
+                <a:xfrm rot="5400000">
+                  <a:off x="7543882" y="5627835"/>
+                  <a:ext cx="508914" cy="283439"/>
+                </a:xfrm>
+                <a:prstGeom prst="can">
+                  <a:avLst/>
+                </a:prstGeom>
+                <a:solidFill>
+                  <a:srgbClr val="00B4E6"/>
+                </a:solidFill>
+              </p:spPr>
+              <p:style>
+                <a:lnRef idx="2">
+                  <a:schemeClr val="accent1">
+                    <a:shade val="50000"/>
+                  </a:schemeClr>
+                </a:lnRef>
+                <a:fillRef idx="1">
+                  <a:schemeClr val="accent1"/>
+                </a:fillRef>
+                <a:effectRef idx="0">
+                  <a:schemeClr val="accent1"/>
+                </a:effectRef>
+                <a:fontRef idx="minor">
+                  <a:schemeClr val="lt1"/>
+                </a:fontRef>
+              </p:style>
+              <p:txBody>
+                <a:bodyPr vert="vert270" rtlCol="0" anchor="ctr"/>
+                <a:lstStyle/>
+                <a:p>
+                  <a:pPr algn="ctr"/>
+                  <a:endParaRPr lang="en-NZ" dirty="0"/>
+                </a:p>
+              </p:txBody>
+            </p:sp>
+            <p:sp>
+              <p:nvSpPr>
+                <p:cNvPr id="34" name="Cylinder 33">
+                  <a:extLst>
+                    <a:ext uri="{FF2B5EF4-FFF2-40B4-BE49-F238E27FC236}">
+                      <a16:creationId xmlns:a16="http://schemas.microsoft.com/office/drawing/2014/main" id="{E2036C0D-0927-CE8C-59B1-B747AB45E266}"/>
+                    </a:ext>
+                  </a:extLst>
+                </p:cNvPr>
+                <p:cNvSpPr/>
+                <p:nvPr/>
+              </p:nvSpPr>
+              <p:spPr>
+                <a:xfrm rot="5400000">
+                  <a:off x="7872894" y="5627831"/>
+                  <a:ext cx="508913" cy="283439"/>
+                </a:xfrm>
+                <a:prstGeom prst="can">
+                  <a:avLst/>
+                </a:prstGeom>
+                <a:solidFill>
+                  <a:srgbClr val="00B4E6"/>
+                </a:solidFill>
+              </p:spPr>
+              <p:style>
+                <a:lnRef idx="2">
+                  <a:schemeClr val="accent1">
+                    <a:shade val="50000"/>
+                  </a:schemeClr>
+                </a:lnRef>
+                <a:fillRef idx="1">
+                  <a:schemeClr val="accent1"/>
+                </a:fillRef>
+                <a:effectRef idx="0">
+                  <a:schemeClr val="accent1"/>
+                </a:effectRef>
+                <a:fontRef idx="minor">
+                  <a:schemeClr val="lt1"/>
+                </a:fontRef>
+              </p:style>
+              <p:txBody>
+                <a:bodyPr vert="vert270" rtlCol="0" anchor="ctr"/>
+                <a:lstStyle/>
+                <a:p>
+                  <a:pPr algn="ctr"/>
+                  <a:endParaRPr lang="en-NZ" dirty="0"/>
+                </a:p>
+              </p:txBody>
+            </p:sp>
+            <p:sp>
+              <p:nvSpPr>
+                <p:cNvPr id="35" name="Cylinder 34">
+                  <a:extLst>
+                    <a:ext uri="{FF2B5EF4-FFF2-40B4-BE49-F238E27FC236}">
+                      <a16:creationId xmlns:a16="http://schemas.microsoft.com/office/drawing/2014/main" id="{1D4443CE-1A84-7A7F-5C97-3C32039472F9}"/>
+                    </a:ext>
+                  </a:extLst>
+                </p:cNvPr>
+                <p:cNvSpPr/>
+                <p:nvPr/>
+              </p:nvSpPr>
+              <p:spPr>
+                <a:xfrm rot="5400000">
+                  <a:off x="8209897" y="5627834"/>
+                  <a:ext cx="508913" cy="283439"/>
+                </a:xfrm>
+                <a:prstGeom prst="can">
+                  <a:avLst/>
+                </a:prstGeom>
+                <a:solidFill>
+                  <a:srgbClr val="96D9E2"/>
+                </a:solidFill>
+              </p:spPr>
+              <p:style>
+                <a:lnRef idx="2">
+                  <a:schemeClr val="accent1">
+                    <a:shade val="50000"/>
+                  </a:schemeClr>
+                </a:lnRef>
+                <a:fillRef idx="1">
+                  <a:schemeClr val="accent1"/>
+                </a:fillRef>
+                <a:effectRef idx="0">
+                  <a:schemeClr val="accent1"/>
+                </a:effectRef>
+                <a:fontRef idx="minor">
+                  <a:schemeClr val="lt1"/>
+                </a:fontRef>
+              </p:style>
+              <p:txBody>
+                <a:bodyPr vert="vert270" rtlCol="0" anchor="ctr"/>
+                <a:lstStyle/>
+                <a:p>
+                  <a:pPr algn="ctr"/>
+                  <a:endParaRPr lang="en-NZ" dirty="0"/>
+                </a:p>
+              </p:txBody>
+            </p:sp>
+            <p:sp>
+              <p:nvSpPr>
+                <p:cNvPr id="36" name="Cylinder 35">
+                  <a:extLst>
+                    <a:ext uri="{FF2B5EF4-FFF2-40B4-BE49-F238E27FC236}">
+                      <a16:creationId xmlns:a16="http://schemas.microsoft.com/office/drawing/2014/main" id="{F8E20C9C-93AB-2ADD-888B-96574880C368}"/>
+                    </a:ext>
+                  </a:extLst>
+                </p:cNvPr>
+                <p:cNvSpPr/>
+                <p:nvPr/>
+              </p:nvSpPr>
+              <p:spPr>
+                <a:xfrm rot="5400000">
+                  <a:off x="8519833" y="5627834"/>
+                  <a:ext cx="508912" cy="283439"/>
+                </a:xfrm>
+                <a:prstGeom prst="can">
+                  <a:avLst/>
+                </a:prstGeom>
+                <a:solidFill>
+                  <a:srgbClr val="96D9E2"/>
+                </a:solidFill>
+              </p:spPr>
+              <p:style>
+                <a:lnRef idx="2">
+                  <a:schemeClr val="accent1">
+                    <a:shade val="50000"/>
+                  </a:schemeClr>
+                </a:lnRef>
+                <a:fillRef idx="1">
+                  <a:schemeClr val="accent1"/>
+                </a:fillRef>
+                <a:effectRef idx="0">
+                  <a:schemeClr val="accent1"/>
+                </a:effectRef>
+                <a:fontRef idx="minor">
+                  <a:schemeClr val="lt1"/>
+                </a:fontRef>
+              </p:style>
+              <p:txBody>
+                <a:bodyPr vert="vert270" rtlCol="0" anchor="ctr"/>
+                <a:lstStyle/>
+                <a:p>
+                  <a:pPr algn="ctr"/>
+                  <a:endParaRPr lang="en-NZ" dirty="0"/>
+                </a:p>
+              </p:txBody>
+            </p:sp>
+            <p:sp>
+              <p:nvSpPr>
+                <p:cNvPr id="37" name="Cylinder 36">
+                  <a:extLst>
+                    <a:ext uri="{FF2B5EF4-FFF2-40B4-BE49-F238E27FC236}">
+                      <a16:creationId xmlns:a16="http://schemas.microsoft.com/office/drawing/2014/main" id="{6768C654-8516-AC19-A75B-0A1DEEC7C6D7}"/>
+                    </a:ext>
+                  </a:extLst>
+                </p:cNvPr>
+                <p:cNvSpPr/>
+                <p:nvPr/>
+              </p:nvSpPr>
+              <p:spPr>
+                <a:xfrm rot="5400000">
+                  <a:off x="8852209" y="5619108"/>
+                  <a:ext cx="508913" cy="283439"/>
+                </a:xfrm>
+                <a:prstGeom prst="can">
+                  <a:avLst/>
+                </a:prstGeom>
+                <a:solidFill>
+                  <a:srgbClr val="96D9E2"/>
+                </a:solidFill>
+              </p:spPr>
+              <p:style>
+                <a:lnRef idx="2">
+                  <a:schemeClr val="accent1">
+                    <a:shade val="50000"/>
+                  </a:schemeClr>
+                </a:lnRef>
+                <a:fillRef idx="1">
+                  <a:schemeClr val="accent1"/>
+                </a:fillRef>
+                <a:effectRef idx="0">
+                  <a:schemeClr val="accent1"/>
+                </a:effectRef>
+                <a:fontRef idx="minor">
+                  <a:schemeClr val="lt1"/>
+                </a:fontRef>
+              </p:style>
+              <p:txBody>
+                <a:bodyPr vert="vert270" rtlCol="0" anchor="ctr"/>
+                <a:lstStyle/>
+                <a:p>
+                  <a:pPr algn="ctr"/>
+                  <a:endParaRPr lang="en-NZ" dirty="0"/>
+                </a:p>
+              </p:txBody>
+            </p:sp>
+            <p:sp>
+              <p:nvSpPr>
+                <p:cNvPr id="38" name="TextBox 37">
+                  <a:extLst>
+                    <a:ext uri="{FF2B5EF4-FFF2-40B4-BE49-F238E27FC236}">
+                      <a16:creationId xmlns:a16="http://schemas.microsoft.com/office/drawing/2014/main" id="{D7862E33-19C8-7E5C-4181-94843EB828EC}"/>
+                    </a:ext>
+                  </a:extLst>
+                </p:cNvPr>
+                <p:cNvSpPr txBox="1"/>
+                <p:nvPr/>
+              </p:nvSpPr>
+              <p:spPr>
+                <a:xfrm>
+                  <a:off x="8369951" y="5576118"/>
+                  <a:ext cx="852979" cy="332901"/>
+                </a:xfrm>
+                <a:prstGeom prst="rect">
+                  <a:avLst/>
+                </a:prstGeom>
+                <a:noFill/>
+              </p:spPr>
+              <p:txBody>
+                <a:bodyPr wrap="square" rtlCol="0">
+                  <a:spAutoFit/>
+                </a:bodyPr>
+                <a:lstStyle/>
+                <a:p>
+                  <a:r>
+                    <a:rPr lang="en-US" sz="1100" dirty="0">
+                      <a:effectLst>
+                        <a:glow rad="101600">
+                          <a:schemeClr val="bg1">
+                            <a:alpha val="60000"/>
+                          </a:schemeClr>
+                        </a:glow>
+                      </a:effectLst>
+                    </a:rPr>
+                    <a:t>Queues</a:t>
+                  </a:r>
+                  <a:endParaRPr lang="en-NZ" sz="1200" dirty="0">
+                    <a:effectLst>
+                      <a:glow rad="101600">
+                        <a:schemeClr val="bg1">
+                          <a:alpha val="60000"/>
+                        </a:schemeClr>
+                      </a:glow>
+                    </a:effectLst>
+                  </a:endParaRPr>
+                </a:p>
+              </p:txBody>
+            </p:sp>
+          </p:grpSp>
+          <p:pic>
+            <p:nvPicPr>
+              <p:cNvPr id="32" name="Picture 31">
+                <a:extLst>
+                  <a:ext uri="{FF2B5EF4-FFF2-40B4-BE49-F238E27FC236}">
+                    <a16:creationId xmlns:a16="http://schemas.microsoft.com/office/drawing/2014/main" id="{4CE39ED0-1454-1944-C8FC-38A9C27AEA2F}"/>
+                  </a:ext>
+                </a:extLst>
+              </p:cNvPr>
+              <p:cNvPicPr>
+                <a:picLocks noChangeAspect="1"/>
+              </p:cNvPicPr>
+              <p:nvPr/>
+            </p:nvPicPr>
+            <p:blipFill>
+              <a:blip r:embed="rId4"/>
+              <a:stretch>
+                <a:fillRect/>
+              </a:stretch>
+            </p:blipFill>
+            <p:spPr>
+              <a:xfrm>
+                <a:off x="7236015" y="5920348"/>
+                <a:ext cx="348582" cy="317597"/>
+              </a:xfrm>
+              <a:prstGeom prst="rect">
+                <a:avLst/>
+              </a:prstGeom>
+            </p:spPr>
+          </p:pic>
+        </p:grpSp>
+        <p:grpSp>
+          <p:nvGrpSpPr>
+            <p:cNvPr id="65" name="Group 64">
+              <a:extLst>
+                <a:ext uri="{FF2B5EF4-FFF2-40B4-BE49-F238E27FC236}">
+                  <a16:creationId xmlns:a16="http://schemas.microsoft.com/office/drawing/2014/main" id="{AD38C339-22AD-F1E4-D54A-B6BCBD6D48A7}"/>
+                </a:ext>
+              </a:extLst>
+            </p:cNvPr>
+            <p:cNvGrpSpPr/>
+            <p:nvPr/>
+          </p:nvGrpSpPr>
+          <p:grpSpPr>
+            <a:xfrm>
+              <a:off x="10053073" y="4351137"/>
+              <a:ext cx="959300" cy="399929"/>
+              <a:chOff x="7334798" y="4191253"/>
+              <a:chExt cx="959300" cy="399929"/>
+            </a:xfrm>
+          </p:grpSpPr>
+          <p:sp>
+            <p:nvSpPr>
+              <p:cNvPr id="66" name="Rectangle: Rounded Corners 65">
+                <a:extLst>
+                  <a:ext uri="{FF2B5EF4-FFF2-40B4-BE49-F238E27FC236}">
+                    <a16:creationId xmlns:a16="http://schemas.microsoft.com/office/drawing/2014/main" id="{A422FA4D-FEAC-B639-7374-05E1F501C49D}"/>
+                  </a:ext>
+                </a:extLst>
+              </p:cNvPr>
+              <p:cNvSpPr/>
+              <p:nvPr/>
+            </p:nvSpPr>
+            <p:spPr>
+              <a:xfrm>
+                <a:off x="7334798" y="4191253"/>
+                <a:ext cx="959300" cy="399929"/>
+              </a:xfrm>
+              <a:prstGeom prst="roundRect">
+                <a:avLst>
+                  <a:gd name="adj" fmla="val 6468"/>
+                </a:avLst>
+              </a:prstGeom>
+              <a:solidFill>
+                <a:schemeClr val="accent4">
+                  <a:lumMod val="60000"/>
+                  <a:lumOff val="40000"/>
+                </a:schemeClr>
+              </a:solidFill>
+            </p:spPr>
+            <p:style>
+              <a:lnRef idx="2">
+                <a:schemeClr val="accent1">
+                  <a:shade val="50000"/>
+                </a:schemeClr>
+              </a:lnRef>
+              <a:fillRef idx="1">
+                <a:schemeClr val="accent1"/>
+              </a:fillRef>
+              <a:effectRef idx="0">
+                <a:schemeClr val="accent1"/>
+              </a:effectRef>
+              <a:fontRef idx="minor">
+                <a:schemeClr val="lt1"/>
+              </a:fontRef>
+            </p:style>
+            <p:txBody>
+              <a:bodyPr rtlCol="0" anchor="ctr"/>
+              <a:lstStyle/>
+              <a:p>
+                <a:pPr algn="r"/>
+                <a:r>
+                  <a:rPr lang="en-US" sz="1000" dirty="0">
+                    <a:solidFill>
+                      <a:schemeClr val="tx1"/>
+                    </a:solidFill>
+                  </a:rPr>
+                  <a:t>Functions</a:t>
+                </a:r>
+                <a:endParaRPr lang="en-US" sz="1200" dirty="0">
+                  <a:solidFill>
+                    <a:schemeClr val="tx1"/>
+                  </a:solidFill>
+                </a:endParaRPr>
+              </a:p>
+            </p:txBody>
+          </p:sp>
+          <p:pic>
+            <p:nvPicPr>
+              <p:cNvPr id="67" name="Picture 4" descr="Azure Functions (@AzureFunctions) / Twitter">
+                <a:extLst>
+                  <a:ext uri="{FF2B5EF4-FFF2-40B4-BE49-F238E27FC236}">
+                    <a16:creationId xmlns:a16="http://schemas.microsoft.com/office/drawing/2014/main" id="{5735C5A8-AEDC-9FC0-FE2D-D71C6DB67554}"/>
+                  </a:ext>
+                </a:extLst>
+              </p:cNvPr>
+              <p:cNvPicPr>
+                <a:picLocks noChangeAspect="1" noChangeArrowheads="1"/>
+              </p:cNvPicPr>
+              <p:nvPr/>
+            </p:nvPicPr>
+            <p:blipFill>
+              <a:blip r:embed="rId5">
+                <a:extLst>
+                  <a:ext uri="{28A0092B-C50C-407E-A947-70E740481C1C}">
+                    <a14:useLocalDpi xmlns:a14="http://schemas.microsoft.com/office/drawing/2010/main" val="0"/>
+                  </a:ext>
+                </a:extLst>
+              </a:blip>
+              <a:srcRect/>
+              <a:stretch>
+                <a:fillRect/>
+              </a:stretch>
+            </p:blipFill>
+            <p:spPr bwMode="auto">
+              <a:xfrm>
+                <a:off x="7364438" y="4251747"/>
+                <a:ext cx="278939" cy="278939"/>
+              </a:xfrm>
+              <a:prstGeom prst="rect">
+                <a:avLst/>
+              </a:prstGeom>
+              <a:noFill/>
+              <a:extLst>
+                <a:ext uri="{909E8E84-426E-40DD-AFC4-6F175D3DCCD1}">
+                  <a14:hiddenFill xmlns:a14="http://schemas.microsoft.com/office/drawing/2010/main">
+                    <a:solidFill>
+                      <a:srgbClr val="FFFFFF"/>
+                    </a:solidFill>
+                  </a14:hiddenFill>
+                </a:ext>
+              </a:extLst>
+            </p:spPr>
+          </p:pic>
+        </p:grpSp>
+      </p:grpSp>
+      <p:sp>
+        <p:nvSpPr>
+          <p:cNvPr id="70" name="TextBox 69">
+            <a:extLst>
+              <a:ext uri="{FF2B5EF4-FFF2-40B4-BE49-F238E27FC236}">
+                <a16:creationId xmlns:a16="http://schemas.microsoft.com/office/drawing/2014/main" id="{CA04463A-E0EF-FAC0-C088-1CBD54A117A5}"/>
+              </a:ext>
+            </a:extLst>
+          </p:cNvPr>
+          <p:cNvSpPr txBox="1"/>
+          <p:nvPr/>
+        </p:nvSpPr>
+        <p:spPr>
+          <a:xfrm rot="5400000">
+            <a:off x="10910995" y="4898336"/>
+            <a:ext cx="1194558" cy="246221"/>
+          </a:xfrm>
+          <a:prstGeom prst="rect">
+            <a:avLst/>
+          </a:prstGeom>
+          <a:noFill/>
+        </p:spPr>
+        <p:txBody>
+          <a:bodyPr wrap="none" rtlCol="0">
+            <a:spAutoFit/>
+          </a:bodyPr>
+          <a:lstStyle/>
+          <a:p>
+            <a:r>
+              <a:rPr lang="en-NZ" sz="1000" dirty="0"/>
+              <a:t>+ Usages / Audits</a:t>
+            </a:r>
+          </a:p>
+        </p:txBody>
+      </p:sp>
+      <p:grpSp>
+        <p:nvGrpSpPr>
+          <p:cNvPr id="107" name="Group 106">
+            <a:extLst>
+              <a:ext uri="{FF2B5EF4-FFF2-40B4-BE49-F238E27FC236}">
+                <a16:creationId xmlns:a16="http://schemas.microsoft.com/office/drawing/2014/main" id="{674347A6-01DB-2B4C-CD77-423C4BCF39FB}"/>
+              </a:ext>
+            </a:extLst>
+          </p:cNvPr>
+          <p:cNvGrpSpPr/>
+          <p:nvPr/>
+        </p:nvGrpSpPr>
+        <p:grpSpPr>
+          <a:xfrm>
+            <a:off x="10007341" y="4848510"/>
+            <a:ext cx="1111013" cy="1781254"/>
+            <a:chOff x="3806550" y="4946699"/>
+            <a:chExt cx="1111013" cy="1781254"/>
+          </a:xfrm>
+        </p:grpSpPr>
+        <p:sp>
+          <p:nvSpPr>
+            <p:cNvPr id="102" name="Rectangle 101">
+              <a:extLst>
+                <a:ext uri="{FF2B5EF4-FFF2-40B4-BE49-F238E27FC236}">
+                  <a16:creationId xmlns:a16="http://schemas.microsoft.com/office/drawing/2014/main" id="{D2C08B74-FF1B-FD94-AF29-32A4E819B1A6}"/>
+                </a:ext>
+              </a:extLst>
+            </p:cNvPr>
+            <p:cNvSpPr/>
+            <p:nvPr/>
+          </p:nvSpPr>
+          <p:spPr>
+            <a:xfrm>
+              <a:off x="3806550" y="4946699"/>
+              <a:ext cx="1111013" cy="1781254"/>
+            </a:xfrm>
+            <a:prstGeom prst="rect">
+              <a:avLst/>
+            </a:prstGeom>
+            <a:solidFill>
+              <a:schemeClr val="bg1">
+                <a:lumMod val="85000"/>
+              </a:schemeClr>
+            </a:solidFill>
+            <a:ln>
+              <a:solidFill>
+                <a:schemeClr val="bg1">
+                  <a:lumMod val="65000"/>
+                </a:schemeClr>
+              </a:solidFill>
+            </a:ln>
+          </p:spPr>
+          <p:style>
+            <a:lnRef idx="2">
+              <a:schemeClr val="accent1">
+                <a:shade val="15000"/>
+              </a:schemeClr>
+            </a:lnRef>
+            <a:fillRef idx="1">
+              <a:schemeClr val="accent1"/>
+            </a:fillRef>
+            <a:effectRef idx="0">
+              <a:schemeClr val="accent1"/>
+            </a:effectRef>
+            <a:fontRef idx="minor">
+              <a:schemeClr val="lt1"/>
+            </a:fontRef>
+          </p:style>
+          <p:txBody>
+            <a:bodyPr lIns="0" rIns="0" rtlCol="0" anchor="b"/>
+            <a:lstStyle/>
+            <a:p>
+              <a:pPr algn="ctr"/>
+              <a:r>
+                <a:rPr lang="en-NZ" sz="1200" dirty="0">
+                  <a:solidFill>
+                    <a:schemeClr val="bg2">
+                      <a:lumMod val="75000"/>
+                    </a:schemeClr>
+                  </a:solidFill>
+                </a:rPr>
+                <a:t>Product Metrics</a:t>
+              </a:r>
+              <a:endParaRPr lang="en-NZ" sz="400" dirty="0">
+                <a:solidFill>
+                  <a:schemeClr val="bg2">
+                    <a:lumMod val="75000"/>
+                  </a:schemeClr>
+                </a:solidFill>
+              </a:endParaRPr>
+            </a:p>
+          </p:txBody>
+        </p:sp>
+        <p:pic>
+          <p:nvPicPr>
+            <p:cNvPr id="103" name="Picture 2" descr="Mixpanel | Attribution Platform - Ematic Solutions">
+              <a:extLst>
+                <a:ext uri="{FF2B5EF4-FFF2-40B4-BE49-F238E27FC236}">
+                  <a16:creationId xmlns:a16="http://schemas.microsoft.com/office/drawing/2014/main" id="{572FC521-E143-BA17-6F85-FBDBA220791C}"/>
+                </a:ext>
+              </a:extLst>
+            </p:cNvPr>
+            <p:cNvPicPr>
+              <a:picLocks noChangeAspect="1" noChangeArrowheads="1"/>
+            </p:cNvPicPr>
+            <p:nvPr/>
+          </p:nvPicPr>
+          <p:blipFill rotWithShape="1">
+            <a:blip r:embed="rId6">
+              <a:clrChange>
+                <a:clrFrom>
+                  <a:srgbClr val="FFFFFF"/>
+                </a:clrFrom>
+                <a:clrTo>
+                  <a:srgbClr val="FFFFFF">
+                    <a:alpha val="0"/>
+                  </a:srgbClr>
+                </a:clrTo>
+              </a:clrChange>
+              <a:extLst>
+                <a:ext uri="{28A0092B-C50C-407E-A947-70E740481C1C}">
+                  <a14:useLocalDpi xmlns:a14="http://schemas.microsoft.com/office/drawing/2010/main" val="0"/>
+                </a:ext>
+              </a:extLst>
+            </a:blip>
+            <a:srcRect l="-1460" t="13489" r="2189" b="10958"/>
+            <a:stretch/>
+          </p:blipFill>
+          <p:spPr bwMode="auto">
+            <a:xfrm rot="20400000">
+              <a:off x="3884797" y="5440538"/>
+              <a:ext cx="940471" cy="267196"/>
+            </a:xfrm>
+            <a:prstGeom prst="rect">
+              <a:avLst/>
+            </a:prstGeom>
+            <a:solidFill>
+              <a:schemeClr val="bg2">
+                <a:lumMod val="75000"/>
+              </a:schemeClr>
+            </a:solidFill>
+            <a:ln w="12700">
+              <a:solidFill>
+                <a:schemeClr val="tx1">
+                  <a:lumMod val="50000"/>
+                  <a:lumOff val="50000"/>
+                </a:schemeClr>
+              </a:solidFill>
+              <a:prstDash val="sysDash"/>
+            </a:ln>
+          </p:spPr>
+        </p:pic>
+        <p:sp>
+          <p:nvSpPr>
+            <p:cNvPr id="104" name="Rectangle 103">
+              <a:extLst>
+                <a:ext uri="{FF2B5EF4-FFF2-40B4-BE49-F238E27FC236}">
+                  <a16:creationId xmlns:a16="http://schemas.microsoft.com/office/drawing/2014/main" id="{717767FE-7BF0-ACA7-EF66-5A9F0D233B7A}"/>
+                </a:ext>
+              </a:extLst>
+            </p:cNvPr>
+            <p:cNvSpPr/>
+            <p:nvPr/>
+          </p:nvSpPr>
+          <p:spPr>
+            <a:xfrm rot="20400000">
+              <a:off x="3891737" y="6102981"/>
+              <a:ext cx="926590" cy="196725"/>
+            </a:xfrm>
+            <a:prstGeom prst="rect">
+              <a:avLst/>
+            </a:prstGeom>
+            <a:solidFill>
+              <a:schemeClr val="bg2">
+                <a:lumMod val="75000"/>
+              </a:schemeClr>
+            </a:solidFill>
+            <a:ln w="12700">
+              <a:solidFill>
+                <a:schemeClr val="tx1">
+                  <a:lumMod val="50000"/>
+                  <a:lumOff val="50000"/>
+                </a:schemeClr>
+              </a:solidFill>
+              <a:prstDash val="sysDash"/>
+            </a:ln>
+          </p:spPr>
+          <p:style>
+            <a:lnRef idx="2">
+              <a:schemeClr val="accent1">
+                <a:shade val="50000"/>
+              </a:schemeClr>
+            </a:lnRef>
+            <a:fillRef idx="1">
+              <a:schemeClr val="accent1"/>
+            </a:fillRef>
+            <a:effectRef idx="0">
+              <a:schemeClr val="accent1"/>
+            </a:effectRef>
+            <a:fontRef idx="minor">
+              <a:schemeClr val="lt1"/>
+            </a:fontRef>
+          </p:style>
+          <p:txBody>
+            <a:bodyPr rtlCol="0" anchor="ctr"/>
+            <a:lstStyle/>
+            <a:p>
+              <a:pPr algn="ctr"/>
+              <a:r>
+                <a:rPr lang="en-US" sz="1200" dirty="0">
+                  <a:solidFill>
+                    <a:schemeClr val="tx1">
+                      <a:lumMod val="50000"/>
+                      <a:lumOff val="50000"/>
+                    </a:schemeClr>
+                  </a:solidFill>
+                </a:rPr>
+                <a:t>Another?</a:t>
+              </a:r>
+              <a:endParaRPr lang="en-NZ" sz="1200" dirty="0">
+                <a:solidFill>
+                  <a:schemeClr val="tx1">
+                    <a:lumMod val="50000"/>
+                    <a:lumOff val="50000"/>
+                  </a:schemeClr>
+                </a:solidFill>
+              </a:endParaRPr>
+            </a:p>
+          </p:txBody>
+        </p:sp>
+        <p:pic>
+          <p:nvPicPr>
+            <p:cNvPr id="105" name="Picture 12" descr="Analyze the impact of personalization in Google Analytics">
+              <a:extLst>
+                <a:ext uri="{FF2B5EF4-FFF2-40B4-BE49-F238E27FC236}">
+                  <a16:creationId xmlns:a16="http://schemas.microsoft.com/office/drawing/2014/main" id="{37F9FE0A-9362-889A-62D5-D912CFF493F7}"/>
+                </a:ext>
+              </a:extLst>
+            </p:cNvPr>
+            <p:cNvPicPr>
+              <a:picLocks noChangeAspect="1" noChangeArrowheads="1"/>
+            </p:cNvPicPr>
+            <p:nvPr/>
+          </p:nvPicPr>
+          <p:blipFill rotWithShape="1">
+            <a:blip r:embed="rId7">
+              <a:clrChange>
+                <a:clrFrom>
+                  <a:srgbClr val="FFFFFF"/>
+                </a:clrFrom>
+                <a:clrTo>
+                  <a:srgbClr val="FFFFFF">
+                    <a:alpha val="0"/>
+                  </a:srgbClr>
+                </a:clrTo>
+              </a:clrChange>
+              <a:extLst>
+                <a:ext uri="{28A0092B-C50C-407E-A947-70E740481C1C}">
+                  <a14:useLocalDpi xmlns:a14="http://schemas.microsoft.com/office/drawing/2010/main" val="0"/>
+                </a:ext>
+              </a:extLst>
+            </a:blip>
+            <a:srcRect l="-3074" t="-1409" r="-5031" b="-4078"/>
+            <a:stretch/>
+          </p:blipFill>
+          <p:spPr bwMode="auto">
+            <a:xfrm rot="20400000">
+              <a:off x="3972053" y="5105614"/>
+              <a:ext cx="765959" cy="255640"/>
+            </a:xfrm>
+            <a:prstGeom prst="rect">
+              <a:avLst/>
+            </a:prstGeom>
+            <a:solidFill>
+              <a:schemeClr val="bg2">
+                <a:lumMod val="75000"/>
+              </a:schemeClr>
+            </a:solidFill>
+            <a:ln w="12700">
+              <a:solidFill>
+                <a:schemeClr val="tx1">
+                  <a:lumMod val="50000"/>
+                  <a:lumOff val="50000"/>
+                </a:schemeClr>
+              </a:solidFill>
+              <a:prstDash val="sysDash"/>
+            </a:ln>
+          </p:spPr>
+        </p:pic>
+        <p:pic>
+          <p:nvPicPr>
+            <p:cNvPr id="106" name="Picture 14" descr="Amplitude Analytics Reviews, Ratings &amp; Features 2023 | Gartner Peer Insights">
+              <a:extLst>
+                <a:ext uri="{FF2B5EF4-FFF2-40B4-BE49-F238E27FC236}">
+                  <a16:creationId xmlns:a16="http://schemas.microsoft.com/office/drawing/2014/main" id="{EEB7BB8D-E23F-B147-8779-384F65663A6E}"/>
+                </a:ext>
+              </a:extLst>
+            </p:cNvPr>
+            <p:cNvPicPr>
+              <a:picLocks noChangeAspect="1" noChangeArrowheads="1"/>
+            </p:cNvPicPr>
+            <p:nvPr/>
+          </p:nvPicPr>
+          <p:blipFill rotWithShape="1">
+            <a:blip r:embed="rId8">
+              <a:clrChange>
+                <a:clrFrom>
+                  <a:srgbClr val="FFFFFF"/>
+                </a:clrFrom>
+                <a:clrTo>
+                  <a:srgbClr val="FFFFFF">
+                    <a:alpha val="0"/>
+                  </a:srgbClr>
+                </a:clrTo>
+              </a:clrChange>
+              <a:extLst>
+                <a:ext uri="{28A0092B-C50C-407E-A947-70E740481C1C}">
+                  <a14:useLocalDpi xmlns:a14="http://schemas.microsoft.com/office/drawing/2010/main" val="0"/>
+                </a:ext>
+              </a:extLst>
+            </a:blip>
+            <a:srcRect t="22393" b="28622"/>
+            <a:stretch/>
+          </p:blipFill>
+          <p:spPr bwMode="auto">
+            <a:xfrm rot="20400000">
+              <a:off x="3892561" y="5779495"/>
+              <a:ext cx="924942" cy="251372"/>
+            </a:xfrm>
+            <a:prstGeom prst="rect">
+              <a:avLst/>
+            </a:prstGeom>
+            <a:solidFill>
+              <a:schemeClr val="bg2">
+                <a:lumMod val="75000"/>
+              </a:schemeClr>
+            </a:solidFill>
+            <a:ln w="12700">
+              <a:solidFill>
+                <a:schemeClr val="tx1">
+                  <a:lumMod val="50000"/>
+                  <a:lumOff val="50000"/>
+                </a:schemeClr>
+              </a:solidFill>
+              <a:prstDash val="sysDash"/>
+            </a:ln>
+          </p:spPr>
+        </p:pic>
+      </p:grpSp>
+      <p:sp>
+        <p:nvSpPr>
+          <p:cNvPr id="131" name="TextBox 130">
+            <a:extLst>
+              <a:ext uri="{FF2B5EF4-FFF2-40B4-BE49-F238E27FC236}">
+                <a16:creationId xmlns:a16="http://schemas.microsoft.com/office/drawing/2014/main" id="{681038C5-BBBE-CDB2-8F3E-DB406DA6D973}"/>
+              </a:ext>
+            </a:extLst>
+          </p:cNvPr>
+          <p:cNvSpPr txBox="1"/>
+          <p:nvPr/>
+        </p:nvSpPr>
+        <p:spPr>
+          <a:xfrm>
+            <a:off x="9125964" y="1408576"/>
+            <a:ext cx="1167307" cy="400110"/>
+          </a:xfrm>
+          <a:prstGeom prst="rect">
+            <a:avLst/>
+          </a:prstGeom>
+          <a:noFill/>
+        </p:spPr>
+        <p:txBody>
+          <a:bodyPr wrap="none" rtlCol="0">
+            <a:spAutoFit/>
+          </a:bodyPr>
+          <a:lstStyle/>
+          <a:p>
+            <a:r>
+              <a:rPr lang="en-NZ" sz="1000" dirty="0"/>
+              <a:t>+Traces/Crashes</a:t>
+            </a:r>
+          </a:p>
+          <a:p>
+            <a:r>
+              <a:rPr lang="en-NZ" sz="1000" dirty="0"/>
+              <a:t>/Measures </a:t>
+            </a:r>
+          </a:p>
+        </p:txBody>
+      </p:sp>
+      <p:grpSp>
+        <p:nvGrpSpPr>
+          <p:cNvPr id="171" name="Group 170">
+            <a:extLst>
+              <a:ext uri="{FF2B5EF4-FFF2-40B4-BE49-F238E27FC236}">
+                <a16:creationId xmlns:a16="http://schemas.microsoft.com/office/drawing/2014/main" id="{1740B6E8-90D1-7CC9-2398-4EC84E31818D}"/>
+              </a:ext>
+            </a:extLst>
+          </p:cNvPr>
+          <p:cNvGrpSpPr/>
+          <p:nvPr/>
+        </p:nvGrpSpPr>
+        <p:grpSpPr>
+          <a:xfrm>
+            <a:off x="9194001" y="3985016"/>
+            <a:ext cx="1932705" cy="516007"/>
+            <a:chOff x="9194001" y="3088730"/>
+            <a:chExt cx="1932705" cy="516007"/>
+          </a:xfrm>
+        </p:grpSpPr>
+        <p:sp>
+          <p:nvSpPr>
+            <p:cNvPr id="132" name="Rectangle 131">
+              <a:extLst>
+                <a:ext uri="{FF2B5EF4-FFF2-40B4-BE49-F238E27FC236}">
+                  <a16:creationId xmlns:a16="http://schemas.microsoft.com/office/drawing/2014/main" id="{A8A727FC-229F-90EA-1C27-A2488A604E59}"/>
+                </a:ext>
+              </a:extLst>
+            </p:cNvPr>
+            <p:cNvSpPr/>
+            <p:nvPr/>
+          </p:nvSpPr>
+          <p:spPr>
+            <a:xfrm>
+              <a:off x="9194001" y="3088730"/>
+              <a:ext cx="1932705" cy="516007"/>
+            </a:xfrm>
+            <a:prstGeom prst="rect">
+              <a:avLst/>
+            </a:prstGeom>
+            <a:solidFill>
+              <a:schemeClr val="bg1">
+                <a:lumMod val="85000"/>
+              </a:schemeClr>
+            </a:solidFill>
+            <a:ln>
+              <a:solidFill>
+                <a:schemeClr val="bg1">
+                  <a:lumMod val="65000"/>
+                </a:schemeClr>
+              </a:solidFill>
+            </a:ln>
+          </p:spPr>
+          <p:style>
+            <a:lnRef idx="2">
+              <a:schemeClr val="accent1">
+                <a:shade val="15000"/>
+              </a:schemeClr>
+            </a:lnRef>
+            <a:fillRef idx="1">
+              <a:schemeClr val="accent1"/>
+            </a:fillRef>
+            <a:effectRef idx="0">
+              <a:schemeClr val="accent1"/>
+            </a:effectRef>
+            <a:fontRef idx="minor">
+              <a:schemeClr val="lt1"/>
+            </a:fontRef>
+          </p:style>
+          <p:txBody>
+            <a:bodyPr rtlCol="0" anchor="ctr"/>
+            <a:lstStyle/>
+            <a:p>
+              <a:pPr algn="r"/>
+              <a:r>
+                <a:rPr lang="en-NZ" dirty="0">
+                  <a:solidFill>
+                    <a:schemeClr val="bg2">
+                      <a:lumMod val="75000"/>
+                    </a:schemeClr>
+                  </a:solidFill>
+                </a:rPr>
+                <a:t>Data</a:t>
+              </a:r>
+            </a:p>
+          </p:txBody>
+        </p:sp>
+        <p:grpSp>
+          <p:nvGrpSpPr>
+            <p:cNvPr id="133" name="Group 132">
+              <a:extLst>
+                <a:ext uri="{FF2B5EF4-FFF2-40B4-BE49-F238E27FC236}">
+                  <a16:creationId xmlns:a16="http://schemas.microsoft.com/office/drawing/2014/main" id="{14BA3CBD-3592-B551-1412-0CA1ECF8F500}"/>
+                </a:ext>
+              </a:extLst>
+            </p:cNvPr>
+            <p:cNvGrpSpPr/>
+            <p:nvPr/>
+          </p:nvGrpSpPr>
+          <p:grpSpPr>
+            <a:xfrm>
+              <a:off x="9763593" y="3119600"/>
+              <a:ext cx="516948" cy="456681"/>
+              <a:chOff x="8813773" y="3114097"/>
+              <a:chExt cx="516948" cy="456681"/>
+            </a:xfrm>
+          </p:grpSpPr>
+          <p:sp>
+            <p:nvSpPr>
+              <p:cNvPr id="134" name="Cylinder 133">
+                <a:extLst>
+                  <a:ext uri="{FF2B5EF4-FFF2-40B4-BE49-F238E27FC236}">
+                    <a16:creationId xmlns:a16="http://schemas.microsoft.com/office/drawing/2014/main" id="{5457BB5E-8393-BCB5-7BC1-AD2476D977A2}"/>
+                  </a:ext>
+                </a:extLst>
+              </p:cNvPr>
+              <p:cNvSpPr/>
+              <p:nvPr/>
+            </p:nvSpPr>
+            <p:spPr>
+              <a:xfrm>
+                <a:off x="8813773" y="3114097"/>
+                <a:ext cx="516948" cy="456681"/>
+              </a:xfrm>
+              <a:prstGeom prst="can">
+                <a:avLst/>
+              </a:prstGeom>
+              <a:solidFill>
+                <a:schemeClr val="bg1">
+                  <a:lumMod val="65000"/>
+                </a:schemeClr>
+              </a:solidFill>
+              <a:ln>
+                <a:prstDash val="sysDash"/>
+              </a:ln>
+            </p:spPr>
+            <p:style>
+              <a:lnRef idx="2">
+                <a:schemeClr val="accent1">
+                  <a:shade val="50000"/>
+                </a:schemeClr>
+              </a:lnRef>
+              <a:fillRef idx="1">
+                <a:schemeClr val="accent1"/>
+              </a:fillRef>
+              <a:effectRef idx="0">
+                <a:schemeClr val="accent1"/>
+              </a:effectRef>
+              <a:fontRef idx="minor">
+                <a:schemeClr val="lt1"/>
+              </a:fontRef>
+            </p:style>
+            <p:txBody>
+              <a:bodyPr rIns="36000" rtlCol="0" anchor="ctr"/>
+              <a:lstStyle/>
+              <a:p>
+                <a:pPr algn="r"/>
+                <a:r>
+                  <a:rPr lang="en-US" sz="900" dirty="0">
+                    <a:solidFill>
+                      <a:schemeClr val="tx1">
+                        <a:lumMod val="65000"/>
+                        <a:lumOff val="35000"/>
+                      </a:schemeClr>
+                    </a:solidFill>
+                  </a:rPr>
+                  <a:t>Table </a:t>
+                </a:r>
+                <a:r>
+                  <a:rPr lang="en-US" sz="800" dirty="0">
+                    <a:solidFill>
+                      <a:schemeClr val="tx1">
+                        <a:lumMod val="65000"/>
+                        <a:lumOff val="35000"/>
+                      </a:schemeClr>
+                    </a:solidFill>
+                  </a:rPr>
+                  <a:t>Storage</a:t>
+                </a:r>
+                <a:endParaRPr lang="en-NZ" sz="900" dirty="0">
+                  <a:solidFill>
+                    <a:schemeClr val="tx1">
+                      <a:lumMod val="65000"/>
+                      <a:lumOff val="35000"/>
+                    </a:schemeClr>
+                  </a:solidFill>
+                </a:endParaRPr>
+              </a:p>
+            </p:txBody>
+          </p:sp>
+          <p:pic>
+            <p:nvPicPr>
+              <p:cNvPr id="135" name="Picture 134">
+                <a:extLst>
+                  <a:ext uri="{FF2B5EF4-FFF2-40B4-BE49-F238E27FC236}">
+                    <a16:creationId xmlns:a16="http://schemas.microsoft.com/office/drawing/2014/main" id="{26330CAA-80B5-DB96-64BA-DBDDFBAC5604}"/>
+                  </a:ext>
+                </a:extLst>
+              </p:cNvPr>
+              <p:cNvPicPr>
+                <a:picLocks noChangeAspect="1"/>
+              </p:cNvPicPr>
+              <p:nvPr/>
+            </p:nvPicPr>
+            <p:blipFill>
+              <a:blip r:embed="rId4"/>
+              <a:stretch>
+                <a:fillRect/>
+              </a:stretch>
+            </p:blipFill>
+            <p:spPr>
+              <a:xfrm>
+                <a:off x="8833187" y="3243336"/>
+                <a:ext cx="192678" cy="151968"/>
+              </a:xfrm>
+              <a:prstGeom prst="rect">
+                <a:avLst/>
+              </a:prstGeom>
+            </p:spPr>
+          </p:pic>
+        </p:grpSp>
+        <p:grpSp>
+          <p:nvGrpSpPr>
+            <p:cNvPr id="136" name="Group 135">
+              <a:extLst>
+                <a:ext uri="{FF2B5EF4-FFF2-40B4-BE49-F238E27FC236}">
+                  <a16:creationId xmlns:a16="http://schemas.microsoft.com/office/drawing/2014/main" id="{D5A27850-E96A-545A-3078-3C0DAECA8F41}"/>
+                </a:ext>
+              </a:extLst>
+            </p:cNvPr>
+            <p:cNvGrpSpPr/>
+            <p:nvPr/>
+          </p:nvGrpSpPr>
+          <p:grpSpPr>
+            <a:xfrm>
+              <a:off x="9220741" y="3113848"/>
+              <a:ext cx="516948" cy="456681"/>
+              <a:chOff x="8813773" y="2558797"/>
+              <a:chExt cx="516948" cy="456681"/>
+            </a:xfrm>
+          </p:grpSpPr>
+          <p:sp>
+            <p:nvSpPr>
+              <p:cNvPr id="137" name="Cylinder 136">
+                <a:extLst>
+                  <a:ext uri="{FF2B5EF4-FFF2-40B4-BE49-F238E27FC236}">
+                    <a16:creationId xmlns:a16="http://schemas.microsoft.com/office/drawing/2014/main" id="{2694B80F-A7EB-FB71-9CE6-55FD307FEA5A}"/>
+                  </a:ext>
+                </a:extLst>
+              </p:cNvPr>
+              <p:cNvSpPr/>
+              <p:nvPr/>
+            </p:nvSpPr>
+            <p:spPr>
+              <a:xfrm>
+                <a:off x="8813773" y="2558797"/>
+                <a:ext cx="516948" cy="456681"/>
+              </a:xfrm>
+              <a:prstGeom prst="can">
+                <a:avLst/>
+              </a:prstGeom>
+              <a:solidFill>
+                <a:srgbClr val="BB1932"/>
+              </a:solidFill>
+              <a:ln>
+                <a:solidFill>
+                  <a:srgbClr val="740000"/>
+                </a:solidFill>
+              </a:ln>
+            </p:spPr>
+            <p:style>
+              <a:lnRef idx="2">
+                <a:schemeClr val="accent1">
+                  <a:shade val="50000"/>
+                </a:schemeClr>
+              </a:lnRef>
+              <a:fillRef idx="1">
+                <a:schemeClr val="accent1"/>
+              </a:fillRef>
+              <a:effectRef idx="0">
+                <a:schemeClr val="accent1"/>
+              </a:effectRef>
+              <a:fontRef idx="minor">
+                <a:schemeClr val="lt1"/>
+              </a:fontRef>
+            </p:style>
+            <p:txBody>
+              <a:bodyPr rIns="36000" rtlCol="0" anchor="ctr"/>
+              <a:lstStyle/>
+              <a:p>
+                <a:pPr algn="r"/>
+                <a:r>
+                  <a:rPr lang="en-US" sz="900" dirty="0">
+                    <a:solidFill>
+                      <a:schemeClr val="tx1"/>
+                    </a:solidFill>
+                  </a:rPr>
+                  <a:t>Azure SQL</a:t>
+                </a:r>
+                <a:endParaRPr lang="en-NZ" sz="900" dirty="0">
+                  <a:solidFill>
+                    <a:schemeClr val="tx1"/>
+                  </a:solidFill>
+                </a:endParaRPr>
+              </a:p>
+            </p:txBody>
+          </p:sp>
+          <p:pic>
+            <p:nvPicPr>
+              <p:cNvPr id="138" name="Picture 137">
+                <a:extLst>
+                  <a:ext uri="{FF2B5EF4-FFF2-40B4-BE49-F238E27FC236}">
+                    <a16:creationId xmlns:a16="http://schemas.microsoft.com/office/drawing/2014/main" id="{2D44528A-E4AA-DBCB-6E78-76B025F0870C}"/>
+                  </a:ext>
+                </a:extLst>
+              </p:cNvPr>
+              <p:cNvPicPr>
+                <a:picLocks noChangeAspect="1"/>
+              </p:cNvPicPr>
+              <p:nvPr/>
+            </p:nvPicPr>
+            <p:blipFill>
+              <a:blip r:embed="rId9"/>
+              <a:stretch>
+                <a:fillRect/>
+              </a:stretch>
+            </p:blipFill>
+            <p:spPr>
+              <a:xfrm>
+                <a:off x="8829354" y="2735984"/>
+                <a:ext cx="182393" cy="176250"/>
+              </a:xfrm>
+              <a:prstGeom prst="rect">
+                <a:avLst/>
+              </a:prstGeom>
+              <a:ln>
+                <a:noFill/>
+              </a:ln>
+            </p:spPr>
+          </p:pic>
+        </p:grpSp>
+      </p:grpSp>
+      <p:sp>
+        <p:nvSpPr>
+          <p:cNvPr id="143" name="TextBox 142">
+            <a:extLst>
+              <a:ext uri="{FF2B5EF4-FFF2-40B4-BE49-F238E27FC236}">
+                <a16:creationId xmlns:a16="http://schemas.microsoft.com/office/drawing/2014/main" id="{E60CA0E4-79E3-2704-539B-87D00ADF7142}"/>
+              </a:ext>
+            </a:extLst>
+          </p:cNvPr>
+          <p:cNvSpPr txBox="1"/>
+          <p:nvPr/>
+        </p:nvSpPr>
+        <p:spPr>
+          <a:xfrm>
+            <a:off x="8563450" y="4021713"/>
+            <a:ext cx="620683" cy="246221"/>
+          </a:xfrm>
+          <a:prstGeom prst="rect">
+            <a:avLst/>
+          </a:prstGeom>
+          <a:noFill/>
+        </p:spPr>
+        <p:txBody>
+          <a:bodyPr wrap="none" rtlCol="0">
+            <a:spAutoFit/>
+          </a:bodyPr>
+          <a:lstStyle/>
+          <a:p>
+            <a:r>
+              <a:rPr lang="en-NZ" sz="1000" dirty="0"/>
+              <a:t>+Audits</a:t>
+            </a:r>
+          </a:p>
+        </p:txBody>
+      </p:sp>
+      <p:sp>
+        <p:nvSpPr>
+          <p:cNvPr id="151" name="TextBox 150">
+            <a:extLst>
+              <a:ext uri="{FF2B5EF4-FFF2-40B4-BE49-F238E27FC236}">
+                <a16:creationId xmlns:a16="http://schemas.microsoft.com/office/drawing/2014/main" id="{B0E19051-8B08-2093-839C-FF25C1416D25}"/>
+              </a:ext>
+            </a:extLst>
+          </p:cNvPr>
+          <p:cNvSpPr txBox="1"/>
+          <p:nvPr/>
+        </p:nvSpPr>
+        <p:spPr>
+          <a:xfrm>
+            <a:off x="9314050" y="5492916"/>
+            <a:ext cx="681597" cy="246221"/>
+          </a:xfrm>
+          <a:prstGeom prst="rect">
+            <a:avLst/>
+          </a:prstGeom>
+          <a:noFill/>
+        </p:spPr>
+        <p:txBody>
+          <a:bodyPr wrap="none" rtlCol="0">
+            <a:spAutoFit/>
+          </a:bodyPr>
+          <a:lstStyle/>
+          <a:p>
+            <a:r>
+              <a:rPr lang="en-NZ" sz="1000" dirty="0"/>
+              <a:t>+Usages</a:t>
+            </a:r>
+          </a:p>
+        </p:txBody>
+      </p:sp>
+      <p:sp>
+        <p:nvSpPr>
+          <p:cNvPr id="152" name="TextBox 151">
+            <a:extLst>
+              <a:ext uri="{FF2B5EF4-FFF2-40B4-BE49-F238E27FC236}">
+                <a16:creationId xmlns:a16="http://schemas.microsoft.com/office/drawing/2014/main" id="{D1F30FD8-3C5F-66D3-43AA-C8F69E367088}"/>
+              </a:ext>
+            </a:extLst>
+          </p:cNvPr>
+          <p:cNvSpPr txBox="1"/>
+          <p:nvPr/>
+        </p:nvSpPr>
+        <p:spPr>
+          <a:xfrm>
+            <a:off x="267419" y="207034"/>
+            <a:ext cx="2600392" cy="461665"/>
+          </a:xfrm>
+          <a:prstGeom prst="rect">
+            <a:avLst/>
+          </a:prstGeom>
+          <a:noFill/>
+        </p:spPr>
+        <p:txBody>
+          <a:bodyPr wrap="none" rtlCol="0">
+            <a:spAutoFit/>
+          </a:bodyPr>
+          <a:lstStyle/>
+          <a:p>
+            <a:r>
+              <a:rPr lang="en-NZ" sz="2400" dirty="0"/>
+              <a:t>Recording - Azure</a:t>
+            </a:r>
+          </a:p>
+        </p:txBody>
+      </p:sp>
+      <p:sp>
+        <p:nvSpPr>
+          <p:cNvPr id="157" name="TextBox 156">
+            <a:extLst>
+              <a:ext uri="{FF2B5EF4-FFF2-40B4-BE49-F238E27FC236}">
+                <a16:creationId xmlns:a16="http://schemas.microsoft.com/office/drawing/2014/main" id="{9E5E79C2-B915-C350-C7F7-010B0A4A06FB}"/>
+              </a:ext>
+            </a:extLst>
+          </p:cNvPr>
+          <p:cNvSpPr txBox="1"/>
+          <p:nvPr/>
+        </p:nvSpPr>
+        <p:spPr>
+          <a:xfrm>
+            <a:off x="3706848" y="1351201"/>
+            <a:ext cx="1106393" cy="338554"/>
+          </a:xfrm>
+          <a:prstGeom prst="rect">
+            <a:avLst/>
+          </a:prstGeom>
+          <a:noFill/>
+        </p:spPr>
+        <p:txBody>
+          <a:bodyPr wrap="none" rtlCol="0">
+            <a:spAutoFit/>
+          </a:bodyPr>
+          <a:lstStyle/>
+          <a:p>
+            <a:r>
+              <a:rPr lang="en-NZ" sz="800" dirty="0"/>
+              <a:t>+Traces/</a:t>
+            </a:r>
+            <a:r>
+              <a:rPr lang="en-NZ" sz="800" dirty="0" err="1"/>
+              <a:t>PageViews</a:t>
+            </a:r>
+            <a:endParaRPr lang="en-NZ" sz="800" dirty="0"/>
+          </a:p>
+          <a:p>
+            <a:r>
+              <a:rPr lang="en-NZ" sz="800" dirty="0"/>
+              <a:t>/Usages</a:t>
+            </a:r>
+          </a:p>
+        </p:txBody>
+      </p:sp>
+      <p:sp>
+        <p:nvSpPr>
+          <p:cNvPr id="170" name="TextBox 169">
+            <a:extLst>
+              <a:ext uri="{FF2B5EF4-FFF2-40B4-BE49-F238E27FC236}">
+                <a16:creationId xmlns:a16="http://schemas.microsoft.com/office/drawing/2014/main" id="{1A442F5E-FE79-C70A-9D9A-128467862624}"/>
+              </a:ext>
+            </a:extLst>
+          </p:cNvPr>
+          <p:cNvSpPr txBox="1"/>
+          <p:nvPr/>
+        </p:nvSpPr>
+        <p:spPr>
+          <a:xfrm rot="16200000">
+            <a:off x="4267102" y="6053610"/>
+            <a:ext cx="944489" cy="215444"/>
+          </a:xfrm>
+          <a:prstGeom prst="rect">
+            <a:avLst/>
+          </a:prstGeom>
+          <a:noFill/>
+        </p:spPr>
+        <p:txBody>
+          <a:bodyPr wrap="none" rtlCol="0">
+            <a:spAutoFit/>
+          </a:bodyPr>
+          <a:lstStyle/>
+          <a:p>
+            <a:r>
+              <a:rPr lang="en-NZ" sz="800" dirty="0"/>
+              <a:t>+ Usages/Audits</a:t>
+            </a:r>
+          </a:p>
+        </p:txBody>
+      </p:sp>
+      <p:grpSp>
+        <p:nvGrpSpPr>
+          <p:cNvPr id="257" name="Group 256">
+            <a:extLst>
+              <a:ext uri="{FF2B5EF4-FFF2-40B4-BE49-F238E27FC236}">
+                <a16:creationId xmlns:a16="http://schemas.microsoft.com/office/drawing/2014/main" id="{3A165621-235E-E7DA-8B1E-B39330FB6941}"/>
+              </a:ext>
+            </a:extLst>
+          </p:cNvPr>
+          <p:cNvGrpSpPr/>
+          <p:nvPr/>
+        </p:nvGrpSpPr>
+        <p:grpSpPr>
+          <a:xfrm>
+            <a:off x="5142447" y="2666425"/>
+            <a:ext cx="3216561" cy="1272168"/>
+            <a:chOff x="5142447" y="285376"/>
+            <a:chExt cx="3216561" cy="1272168"/>
+          </a:xfrm>
+        </p:grpSpPr>
+        <p:grpSp>
+          <p:nvGrpSpPr>
+            <p:cNvPr id="177" name="Group 176">
+              <a:extLst>
+                <a:ext uri="{FF2B5EF4-FFF2-40B4-BE49-F238E27FC236}">
+                  <a16:creationId xmlns:a16="http://schemas.microsoft.com/office/drawing/2014/main" id="{5B39F245-9C52-7A3A-FCCB-917A3258D599}"/>
+                </a:ext>
+              </a:extLst>
+            </p:cNvPr>
+            <p:cNvGrpSpPr/>
+            <p:nvPr/>
+          </p:nvGrpSpPr>
+          <p:grpSpPr>
+            <a:xfrm>
+              <a:off x="5142447" y="285376"/>
+              <a:ext cx="3216561" cy="1272168"/>
+              <a:chOff x="2698105" y="3204588"/>
+              <a:chExt cx="3216561" cy="1272168"/>
+            </a:xfrm>
+          </p:grpSpPr>
+          <p:sp>
+            <p:nvSpPr>
+              <p:cNvPr id="178" name="Rectangle: Rounded Corners 177">
+                <a:extLst>
+                  <a:ext uri="{FF2B5EF4-FFF2-40B4-BE49-F238E27FC236}">
+                    <a16:creationId xmlns:a16="http://schemas.microsoft.com/office/drawing/2014/main" id="{FDB4BCF3-715F-0120-3881-F80A3F36AD3C}"/>
+                  </a:ext>
+                </a:extLst>
+              </p:cNvPr>
+              <p:cNvSpPr/>
+              <p:nvPr/>
+            </p:nvSpPr>
+            <p:spPr>
+              <a:xfrm>
+                <a:off x="2698105" y="3204588"/>
+                <a:ext cx="3216561" cy="1272168"/>
+              </a:xfrm>
+              <a:prstGeom prst="roundRect">
+                <a:avLst>
+                  <a:gd name="adj" fmla="val 5101"/>
+                </a:avLst>
+              </a:prstGeom>
+              <a:solidFill>
+                <a:srgbClr val="0078D7"/>
+              </a:solidFill>
+            </p:spPr>
+            <p:style>
+              <a:lnRef idx="2">
+                <a:schemeClr val="accent1">
+                  <a:shade val="50000"/>
+                </a:schemeClr>
+              </a:lnRef>
+              <a:fillRef idx="1">
+                <a:schemeClr val="accent1"/>
+              </a:fillRef>
+              <a:effectRef idx="0">
+                <a:schemeClr val="accent1"/>
+              </a:effectRef>
+              <a:fontRef idx="minor">
+                <a:schemeClr val="lt1"/>
+              </a:fontRef>
+            </p:style>
+            <p:txBody>
+              <a:bodyPr rtlCol="0" anchor="b"/>
+              <a:lstStyle/>
+              <a:p>
+                <a:r>
+                  <a:rPr lang="en-US" sz="1200" dirty="0"/>
+                  <a:t>              Backend API Host (2)</a:t>
+                </a:r>
+              </a:p>
+            </p:txBody>
+          </p:sp>
+          <p:sp>
+            <p:nvSpPr>
+              <p:cNvPr id="179" name="Rectangle 178">
+                <a:extLst>
+                  <a:ext uri="{FF2B5EF4-FFF2-40B4-BE49-F238E27FC236}">
+                    <a16:creationId xmlns:a16="http://schemas.microsoft.com/office/drawing/2014/main" id="{753DE876-CEB1-3496-0DB9-B3A22055D949}"/>
+                  </a:ext>
+                </a:extLst>
+              </p:cNvPr>
+              <p:cNvSpPr/>
+              <p:nvPr/>
+            </p:nvSpPr>
+            <p:spPr>
+              <a:xfrm>
+                <a:off x="3001084" y="3526720"/>
+                <a:ext cx="1039660" cy="379857"/>
+              </a:xfrm>
+              <a:prstGeom prst="rect">
+                <a:avLst/>
+              </a:prstGeom>
+            </p:spPr>
+            <p:style>
+              <a:lnRef idx="2">
+                <a:schemeClr val="accent1">
+                  <a:shade val="50000"/>
+                </a:schemeClr>
+              </a:lnRef>
+              <a:fillRef idx="1">
+                <a:schemeClr val="accent1"/>
+              </a:fillRef>
+              <a:effectRef idx="0">
+                <a:schemeClr val="accent1"/>
+              </a:effectRef>
+              <a:fontRef idx="minor">
+                <a:schemeClr val="lt1"/>
+              </a:fontRef>
+            </p:style>
+            <p:txBody>
+              <a:bodyPr rtlCol="0" anchor="ctr"/>
+              <a:lstStyle/>
+              <a:p>
+                <a:pPr algn="ctr"/>
+                <a:r>
+                  <a:rPr lang="en-US" sz="1200" dirty="0"/>
+                  <a:t>Other APIs</a:t>
+                </a:r>
+                <a:endParaRPr lang="en-NZ" sz="1200" dirty="0"/>
+              </a:p>
+            </p:txBody>
+          </p:sp>
+          <p:pic>
+            <p:nvPicPr>
+              <p:cNvPr id="180" name="Picture 8" descr="App Service - Web App | Microsoft Azure Mono">
+                <a:extLst>
+                  <a:ext uri="{FF2B5EF4-FFF2-40B4-BE49-F238E27FC236}">
+                    <a16:creationId xmlns:a16="http://schemas.microsoft.com/office/drawing/2014/main" id="{30097C3C-BA30-08AC-263E-85D5D4DB89AC}"/>
+                  </a:ext>
+                </a:extLst>
+              </p:cNvPr>
+              <p:cNvPicPr>
+                <a:picLocks noChangeAspect="1" noChangeArrowheads="1"/>
+              </p:cNvPicPr>
+              <p:nvPr/>
+            </p:nvPicPr>
+            <p:blipFill>
+              <a:blip r:embed="rId10">
+                <a:extLst>
+                  <a:ext uri="{28A0092B-C50C-407E-A947-70E740481C1C}">
+                    <a14:useLocalDpi xmlns:a14="http://schemas.microsoft.com/office/drawing/2010/main" val="0"/>
+                  </a:ext>
+                </a:extLst>
+              </a:blip>
+              <a:srcRect/>
+              <a:stretch>
+                <a:fillRect/>
+              </a:stretch>
+            </p:blipFill>
+            <p:spPr bwMode="auto">
+              <a:xfrm>
+                <a:off x="2778776" y="3953000"/>
+                <a:ext cx="450277" cy="417367"/>
+              </a:xfrm>
+              <a:prstGeom prst="rect">
+                <a:avLst/>
+              </a:prstGeom>
+              <a:noFill/>
+              <a:extLst>
+                <a:ext uri="{909E8E84-426E-40DD-AFC4-6F175D3DCCD1}">
+                  <a14:hiddenFill xmlns:a14="http://schemas.microsoft.com/office/drawing/2010/main">
+                    <a:solidFill>
+                      <a:srgbClr val="FFFFFF"/>
+                    </a:solidFill>
+                  </a14:hiddenFill>
+                </a:ext>
+              </a:extLst>
+            </p:spPr>
+          </p:pic>
+        </p:grpSp>
+        <p:sp>
+          <p:nvSpPr>
+            <p:cNvPr id="182" name="Rectangle 181">
+              <a:extLst>
+                <a:ext uri="{FF2B5EF4-FFF2-40B4-BE49-F238E27FC236}">
+                  <a16:creationId xmlns:a16="http://schemas.microsoft.com/office/drawing/2014/main" id="{71CA4B64-BBBA-FBE8-CE4F-9C7B5918563F}"/>
+                </a:ext>
+              </a:extLst>
+            </p:cNvPr>
+            <p:cNvSpPr/>
+            <p:nvPr/>
+          </p:nvSpPr>
+          <p:spPr>
+            <a:xfrm>
+              <a:off x="6858638" y="645253"/>
+              <a:ext cx="1169933" cy="306177"/>
+            </a:xfrm>
+            <a:prstGeom prst="rect">
+              <a:avLst/>
+            </a:prstGeom>
+            <a:solidFill>
+              <a:schemeClr val="accent5">
+                <a:lumMod val="60000"/>
+                <a:lumOff val="40000"/>
+              </a:schemeClr>
+            </a:solidFill>
+            <a:ln>
+              <a:prstDash val="sysDash"/>
+            </a:ln>
+          </p:spPr>
+          <p:style>
+            <a:lnRef idx="2">
+              <a:schemeClr val="accent1">
+                <a:shade val="50000"/>
+              </a:schemeClr>
+            </a:lnRef>
+            <a:fillRef idx="1">
+              <a:schemeClr val="accent1"/>
+            </a:fillRef>
+            <a:effectRef idx="0">
+              <a:schemeClr val="accent1"/>
+            </a:effectRef>
+            <a:fontRef idx="minor">
+              <a:schemeClr val="lt1"/>
+            </a:fontRef>
+          </p:style>
+          <p:txBody>
+            <a:bodyPr rtlCol="0" anchor="ctr"/>
+            <a:lstStyle/>
+            <a:p>
+              <a:pPr algn="ctr"/>
+              <a:r>
+                <a:rPr lang="en-US" sz="1200" dirty="0" err="1">
+                  <a:solidFill>
+                    <a:schemeClr val="tx1"/>
+                  </a:solidFill>
+                </a:rPr>
+                <a:t>HostRecorder</a:t>
+              </a:r>
+              <a:endParaRPr lang="en-NZ" sz="1200" dirty="0">
+                <a:solidFill>
+                  <a:schemeClr val="tx1"/>
+                </a:solidFill>
+              </a:endParaRPr>
+            </a:p>
+          </p:txBody>
+        </p:sp>
+        <p:cxnSp>
+          <p:nvCxnSpPr>
+            <p:cNvPr id="183" name="Straight Arrow Connector 38">
+              <a:extLst>
+                <a:ext uri="{FF2B5EF4-FFF2-40B4-BE49-F238E27FC236}">
+                  <a16:creationId xmlns:a16="http://schemas.microsoft.com/office/drawing/2014/main" id="{495DA6AB-7B0F-C415-B2DE-4A5F7E84CAEB}"/>
+                </a:ext>
+              </a:extLst>
+            </p:cNvPr>
+            <p:cNvCxnSpPr>
+              <a:cxnSpLocks/>
+              <a:stCxn id="179" idx="3"/>
+              <a:endCxn id="182" idx="1"/>
+            </p:cNvCxnSpPr>
+            <p:nvPr/>
+          </p:nvCxnSpPr>
+          <p:spPr>
+            <a:xfrm>
+              <a:off x="6485086" y="797437"/>
+              <a:ext cx="373552" cy="905"/>
+            </a:xfrm>
+            <a:prstGeom prst="bentConnector3">
+              <a:avLst>
+                <a:gd name="adj1" fmla="val 50000"/>
+              </a:avLst>
+            </a:prstGeom>
+            <a:ln w="19050" cap="flat" cmpd="sng" algn="ctr">
+              <a:solidFill>
+                <a:schemeClr val="dk1"/>
+              </a:solidFill>
+              <a:prstDash val="solid"/>
+              <a:round/>
+              <a:headEnd type="none" w="med" len="med"/>
+              <a:tailEnd type="arrow" w="med" len="med"/>
+            </a:ln>
+          </p:spPr>
+          <p:style>
+            <a:lnRef idx="0">
+              <a:scrgbClr r="0" g="0" b="0"/>
+            </a:lnRef>
+            <a:fillRef idx="0">
+              <a:scrgbClr r="0" g="0" b="0"/>
+            </a:fillRef>
+            <a:effectRef idx="0">
+              <a:scrgbClr r="0" g="0" b="0"/>
+            </a:effectRef>
+            <a:fontRef idx="minor">
+              <a:schemeClr val="tx1"/>
+            </a:fontRef>
+          </p:style>
+        </p:cxnSp>
+        <p:sp>
+          <p:nvSpPr>
+            <p:cNvPr id="253" name="TextBox 252">
+              <a:extLst>
+                <a:ext uri="{FF2B5EF4-FFF2-40B4-BE49-F238E27FC236}">
+                  <a16:creationId xmlns:a16="http://schemas.microsoft.com/office/drawing/2014/main" id="{917D1C44-1D4E-7E37-AE56-8DC6284F8E8C}"/>
+                </a:ext>
+              </a:extLst>
+            </p:cNvPr>
+            <p:cNvSpPr txBox="1"/>
+            <p:nvPr/>
+          </p:nvSpPr>
+          <p:spPr>
+            <a:xfrm>
+              <a:off x="6453818" y="317518"/>
+              <a:ext cx="1492716" cy="338554"/>
+            </a:xfrm>
+            <a:prstGeom prst="rect">
+              <a:avLst/>
+            </a:prstGeom>
+            <a:noFill/>
+          </p:spPr>
+          <p:txBody>
+            <a:bodyPr wrap="none" rtlCol="0">
+              <a:spAutoFit/>
+            </a:bodyPr>
+            <a:lstStyle/>
+            <a:p>
+              <a:r>
+                <a:rPr lang="en-NZ" sz="800" dirty="0"/>
+                <a:t>+ Traces/Crashes/Measures</a:t>
+              </a:r>
+            </a:p>
+            <a:p>
+              <a:r>
+                <a:rPr lang="en-NZ" sz="800" dirty="0"/>
+                <a:t>Audits/Usages</a:t>
+              </a:r>
+            </a:p>
+          </p:txBody>
+        </p:sp>
+      </p:grpSp>
+      <p:grpSp>
+        <p:nvGrpSpPr>
+          <p:cNvPr id="277" name="Group 276">
+            <a:extLst>
+              <a:ext uri="{FF2B5EF4-FFF2-40B4-BE49-F238E27FC236}">
+                <a16:creationId xmlns:a16="http://schemas.microsoft.com/office/drawing/2014/main" id="{2E4C4615-C751-A78A-1594-530765A7C30C}"/>
+              </a:ext>
+            </a:extLst>
+          </p:cNvPr>
+          <p:cNvGrpSpPr/>
+          <p:nvPr/>
+        </p:nvGrpSpPr>
+        <p:grpSpPr>
+          <a:xfrm>
+            <a:off x="5146016" y="4052454"/>
+            <a:ext cx="3212992" cy="2361751"/>
+            <a:chOff x="5146016" y="2839293"/>
+            <a:chExt cx="3212992" cy="2361751"/>
+          </a:xfrm>
+        </p:grpSpPr>
+        <p:sp>
+          <p:nvSpPr>
+            <p:cNvPr id="44" name="Oval 43">
+              <a:extLst>
+                <a:ext uri="{FF2B5EF4-FFF2-40B4-BE49-F238E27FC236}">
+                  <a16:creationId xmlns:a16="http://schemas.microsoft.com/office/drawing/2014/main" id="{79CE5E8B-7050-54BB-4FEC-402F4067C4CB}"/>
+                </a:ext>
+              </a:extLst>
+            </p:cNvPr>
+            <p:cNvSpPr/>
+            <p:nvPr/>
+          </p:nvSpPr>
+          <p:spPr>
+            <a:xfrm>
+              <a:off x="6593831" y="3222985"/>
+              <a:ext cx="175950" cy="175950"/>
+            </a:xfrm>
+            <a:prstGeom prst="ellipse">
+              <a:avLst/>
+            </a:prstGeom>
+            <a:solidFill>
+              <a:srgbClr val="0078D7"/>
+            </a:solidFill>
+            <a:ln>
+              <a:solidFill>
+                <a:srgbClr val="0078D7"/>
+              </a:solidFill>
+            </a:ln>
+          </p:spPr>
+          <p:style>
+            <a:lnRef idx="2">
+              <a:schemeClr val="accent1">
+                <a:shade val="50000"/>
+              </a:schemeClr>
+            </a:lnRef>
+            <a:fillRef idx="1">
+              <a:schemeClr val="accent1"/>
+            </a:fillRef>
+            <a:effectRef idx="0">
+              <a:schemeClr val="accent1"/>
+            </a:effectRef>
+            <a:fontRef idx="minor">
+              <a:schemeClr val="lt1"/>
+            </a:fontRef>
+          </p:style>
+          <p:txBody>
+            <a:bodyPr rtlCol="0" anchor="ctr"/>
+            <a:lstStyle/>
+            <a:p>
+              <a:pPr algn="ctr"/>
+              <a:endParaRPr lang="en-NZ" dirty="0"/>
+            </a:p>
+          </p:txBody>
+        </p:sp>
+        <p:sp>
+          <p:nvSpPr>
+            <p:cNvPr id="45" name="Oval 44">
+              <a:extLst>
+                <a:ext uri="{FF2B5EF4-FFF2-40B4-BE49-F238E27FC236}">
+                  <a16:creationId xmlns:a16="http://schemas.microsoft.com/office/drawing/2014/main" id="{4D5B1FC5-355F-D779-27F2-0E1616741948}"/>
+                </a:ext>
+              </a:extLst>
+            </p:cNvPr>
+            <p:cNvSpPr/>
+            <p:nvPr/>
+          </p:nvSpPr>
+          <p:spPr>
+            <a:xfrm>
+              <a:off x="5151350" y="4058889"/>
+              <a:ext cx="175950" cy="175950"/>
+            </a:xfrm>
+            <a:prstGeom prst="ellipse">
+              <a:avLst/>
+            </a:prstGeom>
+            <a:solidFill>
+              <a:schemeClr val="accent2"/>
+            </a:solidFill>
+            <a:ln>
+              <a:solidFill>
+                <a:schemeClr val="accent1"/>
+              </a:solidFill>
+            </a:ln>
+          </p:spPr>
+          <p:style>
+            <a:lnRef idx="2">
+              <a:schemeClr val="accent1">
+                <a:shade val="50000"/>
+              </a:schemeClr>
+            </a:lnRef>
+            <a:fillRef idx="1">
+              <a:schemeClr val="accent1"/>
+            </a:fillRef>
+            <a:effectRef idx="0">
+              <a:schemeClr val="accent1"/>
+            </a:effectRef>
+            <a:fontRef idx="minor">
+              <a:schemeClr val="lt1"/>
+            </a:fontRef>
+          </p:style>
+          <p:txBody>
+            <a:bodyPr rtlCol="0" anchor="ctr"/>
+            <a:lstStyle/>
+            <a:p>
+              <a:pPr algn="ctr"/>
+              <a:endParaRPr lang="en-NZ"/>
+            </a:p>
+          </p:txBody>
+        </p:sp>
+        <p:sp>
+          <p:nvSpPr>
+            <p:cNvPr id="46" name="Oval 45">
+              <a:extLst>
+                <a:ext uri="{FF2B5EF4-FFF2-40B4-BE49-F238E27FC236}">
+                  <a16:creationId xmlns:a16="http://schemas.microsoft.com/office/drawing/2014/main" id="{96B99708-837C-E579-0827-22206F609EB9}"/>
+                </a:ext>
+              </a:extLst>
+            </p:cNvPr>
+            <p:cNvSpPr/>
+            <p:nvPr/>
+          </p:nvSpPr>
+          <p:spPr>
+            <a:xfrm>
+              <a:off x="5157986" y="4625864"/>
+              <a:ext cx="175950" cy="175950"/>
+            </a:xfrm>
+            <a:prstGeom prst="ellipse">
+              <a:avLst/>
+            </a:prstGeom>
+            <a:solidFill>
+              <a:schemeClr val="accent2"/>
+            </a:solidFill>
+            <a:ln>
+              <a:solidFill>
+                <a:schemeClr val="accent1"/>
+              </a:solidFill>
+            </a:ln>
+          </p:spPr>
+          <p:style>
+            <a:lnRef idx="2">
+              <a:schemeClr val="accent1">
+                <a:shade val="50000"/>
+              </a:schemeClr>
+            </a:lnRef>
+            <a:fillRef idx="1">
+              <a:schemeClr val="accent1"/>
+            </a:fillRef>
+            <a:effectRef idx="0">
+              <a:schemeClr val="accent1"/>
+            </a:effectRef>
+            <a:fontRef idx="minor">
+              <a:schemeClr val="lt1"/>
+            </a:fontRef>
+          </p:style>
+          <p:txBody>
+            <a:bodyPr rtlCol="0" anchor="ctr"/>
+            <a:lstStyle/>
+            <a:p>
+              <a:pPr algn="ctr"/>
+              <a:endParaRPr lang="en-NZ"/>
+            </a:p>
+          </p:txBody>
+        </p:sp>
+        <p:sp>
+          <p:nvSpPr>
+            <p:cNvPr id="47" name="Rectangle: Rounded Corners 46">
+              <a:extLst>
+                <a:ext uri="{FF2B5EF4-FFF2-40B4-BE49-F238E27FC236}">
+                  <a16:creationId xmlns:a16="http://schemas.microsoft.com/office/drawing/2014/main" id="{B44A569B-35FE-1BC1-9722-3ECC9E514393}"/>
+                </a:ext>
+              </a:extLst>
+            </p:cNvPr>
+            <p:cNvSpPr/>
+            <p:nvPr/>
+          </p:nvSpPr>
+          <p:spPr>
+            <a:xfrm>
+              <a:off x="5146016" y="2839293"/>
+              <a:ext cx="3212992" cy="2361751"/>
+            </a:xfrm>
+            <a:prstGeom prst="roundRect">
+              <a:avLst>
+                <a:gd name="adj" fmla="val 4576"/>
+              </a:avLst>
+            </a:prstGeom>
+            <a:solidFill>
+              <a:srgbClr val="0078D7"/>
+            </a:solidFill>
+          </p:spPr>
+          <p:style>
+            <a:lnRef idx="2">
+              <a:schemeClr val="accent1">
+                <a:shade val="50000"/>
+              </a:schemeClr>
+            </a:lnRef>
+            <a:fillRef idx="1">
+              <a:schemeClr val="accent1"/>
+            </a:fillRef>
+            <a:effectRef idx="0">
+              <a:schemeClr val="accent1"/>
+            </a:effectRef>
+            <a:fontRef idx="minor">
+              <a:schemeClr val="lt1"/>
+            </a:fontRef>
+          </p:style>
+          <p:txBody>
+            <a:bodyPr rtlCol="0" anchor="b"/>
+            <a:lstStyle/>
+            <a:p>
+              <a:r>
+                <a:rPr lang="en-US" sz="1200" dirty="0"/>
+                <a:t>              </a:t>
+              </a:r>
+              <a:r>
+                <a:rPr lang="en-US" sz="1200" dirty="0" err="1"/>
+                <a:t>BackEnd</a:t>
+              </a:r>
+              <a:r>
+                <a:rPr lang="en-US" sz="1200" dirty="0"/>
+                <a:t> API Host (1)</a:t>
+              </a:r>
+              <a:endParaRPr lang="en-NZ" dirty="0"/>
+            </a:p>
+          </p:txBody>
+        </p:sp>
+        <p:sp>
+          <p:nvSpPr>
+            <p:cNvPr id="49" name="Rectangle 48">
+              <a:extLst>
+                <a:ext uri="{FF2B5EF4-FFF2-40B4-BE49-F238E27FC236}">
+                  <a16:creationId xmlns:a16="http://schemas.microsoft.com/office/drawing/2014/main" id="{C4C74057-B086-B52F-0A6F-A44483AC67D8}"/>
+                </a:ext>
+              </a:extLst>
+            </p:cNvPr>
+            <p:cNvSpPr/>
+            <p:nvPr/>
+          </p:nvSpPr>
+          <p:spPr>
+            <a:xfrm>
+              <a:off x="5308720" y="3040435"/>
+              <a:ext cx="1237773" cy="445873"/>
+            </a:xfrm>
+            <a:prstGeom prst="rect">
+              <a:avLst/>
+            </a:prstGeom>
+            <a:solidFill>
+              <a:schemeClr val="accent1"/>
+            </a:solidFill>
+          </p:spPr>
+          <p:style>
+            <a:lnRef idx="2">
+              <a:schemeClr val="accent1">
+                <a:shade val="50000"/>
+              </a:schemeClr>
+            </a:lnRef>
+            <a:fillRef idx="1">
+              <a:schemeClr val="accent1"/>
+            </a:fillRef>
+            <a:effectRef idx="0">
+              <a:schemeClr val="accent1"/>
+            </a:effectRef>
+            <a:fontRef idx="minor">
+              <a:schemeClr val="lt1"/>
+            </a:fontRef>
+          </p:style>
+          <p:txBody>
+            <a:bodyPr rtlCol="0" anchor="ctr"/>
+            <a:lstStyle/>
+            <a:p>
+              <a:pPr algn="ctr"/>
+              <a:r>
+                <a:rPr lang="en-US" sz="1200" dirty="0">
+                  <a:solidFill>
+                    <a:schemeClr val="bg1"/>
+                  </a:solidFill>
+                </a:rPr>
+                <a:t>Other APIs</a:t>
+              </a:r>
+              <a:endParaRPr lang="en-NZ" sz="1200" dirty="0">
+                <a:solidFill>
+                  <a:schemeClr val="bg1"/>
+                </a:solidFill>
+              </a:endParaRPr>
+            </a:p>
+          </p:txBody>
+        </p:sp>
+        <p:sp>
+          <p:nvSpPr>
+            <p:cNvPr id="53" name="Rectangle 52">
+              <a:extLst>
+                <a:ext uri="{FF2B5EF4-FFF2-40B4-BE49-F238E27FC236}">
+                  <a16:creationId xmlns:a16="http://schemas.microsoft.com/office/drawing/2014/main" id="{3507010C-DE69-575A-0FED-FBCE2EB24490}"/>
+                </a:ext>
+              </a:extLst>
+            </p:cNvPr>
+            <p:cNvSpPr/>
+            <p:nvPr/>
+          </p:nvSpPr>
+          <p:spPr>
+            <a:xfrm>
+              <a:off x="5301997" y="4149220"/>
+              <a:ext cx="1221842" cy="445873"/>
+            </a:xfrm>
+            <a:prstGeom prst="rect">
+              <a:avLst/>
+            </a:prstGeom>
+            <a:solidFill>
+              <a:schemeClr val="accent1"/>
+            </a:solidFill>
+          </p:spPr>
+          <p:style>
+            <a:lnRef idx="2">
+              <a:schemeClr val="accent1">
+                <a:shade val="50000"/>
+              </a:schemeClr>
+            </a:lnRef>
+            <a:fillRef idx="1">
+              <a:schemeClr val="accent1"/>
+            </a:fillRef>
+            <a:effectRef idx="0">
+              <a:schemeClr val="accent1"/>
+            </a:effectRef>
+            <a:fontRef idx="minor">
+              <a:schemeClr val="lt1"/>
+            </a:fontRef>
+          </p:style>
+          <p:txBody>
+            <a:bodyPr rtlCol="0" anchor="ctr"/>
+            <a:lstStyle/>
+            <a:p>
+              <a:pPr algn="ctr"/>
+              <a:r>
+                <a:rPr lang="en-US" sz="1200" dirty="0">
+                  <a:solidFill>
+                    <a:schemeClr val="bg1"/>
+                  </a:solidFill>
+                </a:rPr>
+                <a:t>Ancillary API</a:t>
+              </a:r>
+              <a:endParaRPr lang="en-NZ" sz="1200" dirty="0">
+                <a:solidFill>
+                  <a:schemeClr val="bg1"/>
+                </a:solidFill>
+              </a:endParaRPr>
+            </a:p>
+          </p:txBody>
+        </p:sp>
+        <p:pic>
+          <p:nvPicPr>
+            <p:cNvPr id="57" name="Picture 8" descr="App Service - Web App | Microsoft Azure Mono">
+              <a:extLst>
+                <a:ext uri="{FF2B5EF4-FFF2-40B4-BE49-F238E27FC236}">
+                  <a16:creationId xmlns:a16="http://schemas.microsoft.com/office/drawing/2014/main" id="{8AA66BF7-E839-2983-8626-E3F363685F94}"/>
+                </a:ext>
+              </a:extLst>
+            </p:cNvPr>
+            <p:cNvPicPr>
+              <a:picLocks noChangeAspect="1" noChangeArrowheads="1"/>
+            </p:cNvPicPr>
+            <p:nvPr/>
+          </p:nvPicPr>
+          <p:blipFill>
+            <a:blip r:embed="rId10">
+              <a:extLst>
+                <a:ext uri="{28A0092B-C50C-407E-A947-70E740481C1C}">
+                  <a14:useLocalDpi xmlns:a14="http://schemas.microsoft.com/office/drawing/2010/main" val="0"/>
+                </a:ext>
+              </a:extLst>
+            </a:blip>
+            <a:srcRect/>
+            <a:stretch>
+              <a:fillRect/>
+            </a:stretch>
+          </p:blipFill>
+          <p:spPr bwMode="auto">
+            <a:xfrm>
+              <a:off x="5229260" y="4650828"/>
+              <a:ext cx="450277" cy="450277"/>
+            </a:xfrm>
+            <a:prstGeom prst="rect">
+              <a:avLst/>
+            </a:prstGeom>
+            <a:noFill/>
+            <a:extLst>
+              <a:ext uri="{909E8E84-426E-40DD-AFC4-6F175D3DCCD1}">
+                <a14:hiddenFill xmlns:a14="http://schemas.microsoft.com/office/drawing/2010/main">
+                  <a:solidFill>
+                    <a:srgbClr val="FFFFFF"/>
+                  </a:solidFill>
+                </a14:hiddenFill>
+              </a:ext>
+            </a:extLst>
+          </p:spPr>
+        </p:pic>
+        <p:sp>
+          <p:nvSpPr>
+            <p:cNvPr id="123" name="Rectangle 122">
+              <a:extLst>
+                <a:ext uri="{FF2B5EF4-FFF2-40B4-BE49-F238E27FC236}">
+                  <a16:creationId xmlns:a16="http://schemas.microsoft.com/office/drawing/2014/main" id="{6DA5FEB2-D31D-D8E0-50E8-E4554192A373}"/>
+                </a:ext>
+              </a:extLst>
+            </p:cNvPr>
+            <p:cNvSpPr/>
+            <p:nvPr/>
+          </p:nvSpPr>
+          <p:spPr>
+            <a:xfrm>
+              <a:off x="7020843" y="3370873"/>
+              <a:ext cx="1169933" cy="306177"/>
+            </a:xfrm>
+            <a:prstGeom prst="rect">
+              <a:avLst/>
+            </a:prstGeom>
+            <a:solidFill>
+              <a:schemeClr val="accent5">
+                <a:lumMod val="60000"/>
+                <a:lumOff val="40000"/>
+              </a:schemeClr>
+            </a:solidFill>
+            <a:ln>
+              <a:prstDash val="sysDash"/>
+            </a:ln>
+          </p:spPr>
+          <p:style>
+            <a:lnRef idx="2">
+              <a:schemeClr val="accent1">
+                <a:shade val="50000"/>
+              </a:schemeClr>
+            </a:lnRef>
+            <a:fillRef idx="1">
+              <a:schemeClr val="accent1"/>
+            </a:fillRef>
+            <a:effectRef idx="0">
+              <a:schemeClr val="accent1"/>
+            </a:effectRef>
+            <a:fontRef idx="minor">
+              <a:schemeClr val="lt1"/>
+            </a:fontRef>
+          </p:style>
+          <p:txBody>
+            <a:bodyPr rtlCol="0" anchor="ctr"/>
+            <a:lstStyle/>
+            <a:p>
+              <a:pPr algn="ctr"/>
+              <a:r>
+                <a:rPr lang="en-US" sz="1200" dirty="0" err="1">
+                  <a:solidFill>
+                    <a:schemeClr val="tx1"/>
+                  </a:solidFill>
+                </a:rPr>
+                <a:t>HostRecorder</a:t>
+              </a:r>
+              <a:endParaRPr lang="en-NZ" sz="1200" dirty="0">
+                <a:solidFill>
+                  <a:schemeClr val="tx1"/>
+                </a:solidFill>
+              </a:endParaRPr>
+            </a:p>
+          </p:txBody>
+        </p:sp>
+        <p:cxnSp>
+          <p:nvCxnSpPr>
+            <p:cNvPr id="124" name="Straight Arrow Connector 38">
+              <a:extLst>
+                <a:ext uri="{FF2B5EF4-FFF2-40B4-BE49-F238E27FC236}">
+                  <a16:creationId xmlns:a16="http://schemas.microsoft.com/office/drawing/2014/main" id="{DF0440B5-6D0B-E640-63B2-459D806653A5}"/>
+                </a:ext>
+              </a:extLst>
+            </p:cNvPr>
+            <p:cNvCxnSpPr>
+              <a:cxnSpLocks/>
+              <a:stCxn id="49" idx="3"/>
+              <a:endCxn id="123" idx="1"/>
+            </p:cNvCxnSpPr>
+            <p:nvPr/>
+          </p:nvCxnSpPr>
+          <p:spPr>
+            <a:xfrm>
+              <a:off x="6546493" y="3263372"/>
+              <a:ext cx="474350" cy="260590"/>
+            </a:xfrm>
+            <a:prstGeom prst="bentConnector3">
+              <a:avLst>
+                <a:gd name="adj1" fmla="val 50000"/>
+              </a:avLst>
+            </a:prstGeom>
+            <a:ln w="19050" cap="flat" cmpd="sng" algn="ctr">
+              <a:solidFill>
+                <a:schemeClr val="dk1"/>
+              </a:solidFill>
+              <a:prstDash val="solid"/>
+              <a:round/>
+              <a:headEnd type="none" w="med" len="med"/>
+              <a:tailEnd type="arrow" w="med" len="med"/>
+            </a:ln>
+          </p:spPr>
+          <p:style>
+            <a:lnRef idx="0">
+              <a:scrgbClr r="0" g="0" b="0"/>
+            </a:lnRef>
+            <a:fillRef idx="0">
+              <a:scrgbClr r="0" g="0" b="0"/>
+            </a:fillRef>
+            <a:effectRef idx="0">
+              <a:scrgbClr r="0" g="0" b="0"/>
+            </a:effectRef>
+            <a:fontRef idx="minor">
+              <a:schemeClr val="tx1"/>
+            </a:fontRef>
+          </p:style>
+        </p:cxnSp>
+        <p:sp>
+          <p:nvSpPr>
+            <p:cNvPr id="159" name="Rectangle 158">
+              <a:extLst>
+                <a:ext uri="{FF2B5EF4-FFF2-40B4-BE49-F238E27FC236}">
+                  <a16:creationId xmlns:a16="http://schemas.microsoft.com/office/drawing/2014/main" id="{B144BAC2-2681-6E0E-0F2A-6205B50FC9C9}"/>
+                </a:ext>
+              </a:extLst>
+            </p:cNvPr>
+            <p:cNvSpPr/>
+            <p:nvPr/>
+          </p:nvSpPr>
+          <p:spPr>
+            <a:xfrm>
+              <a:off x="5301997" y="3584856"/>
+              <a:ext cx="1237773" cy="445873"/>
+            </a:xfrm>
+            <a:prstGeom prst="rect">
+              <a:avLst/>
+            </a:prstGeom>
+            <a:solidFill>
+              <a:schemeClr val="accent1"/>
+            </a:solidFill>
+          </p:spPr>
+          <p:style>
+            <a:lnRef idx="2">
+              <a:schemeClr val="accent1">
+                <a:shade val="50000"/>
+              </a:schemeClr>
+            </a:lnRef>
+            <a:fillRef idx="1">
+              <a:schemeClr val="accent1"/>
+            </a:fillRef>
+            <a:effectRef idx="0">
+              <a:schemeClr val="accent1"/>
+            </a:effectRef>
+            <a:fontRef idx="minor">
+              <a:schemeClr val="lt1"/>
+            </a:fontRef>
+          </p:style>
+          <p:txBody>
+            <a:bodyPr rtlCol="0" anchor="ctr"/>
+            <a:lstStyle/>
+            <a:p>
+              <a:pPr algn="ctr"/>
+              <a:r>
+                <a:rPr lang="en-US" sz="1200" dirty="0">
+                  <a:solidFill>
+                    <a:schemeClr val="bg1"/>
+                  </a:solidFill>
+                </a:rPr>
+                <a:t>Recording API</a:t>
+              </a:r>
+              <a:endParaRPr lang="en-NZ" sz="1200" dirty="0">
+                <a:solidFill>
+                  <a:schemeClr val="bg1"/>
+                </a:solidFill>
+              </a:endParaRPr>
+            </a:p>
+          </p:txBody>
+        </p:sp>
+        <p:cxnSp>
+          <p:nvCxnSpPr>
+            <p:cNvPr id="166" name="Straight Arrow Connector 38">
+              <a:extLst>
+                <a:ext uri="{FF2B5EF4-FFF2-40B4-BE49-F238E27FC236}">
+                  <a16:creationId xmlns:a16="http://schemas.microsoft.com/office/drawing/2014/main" id="{EDC29464-B4EE-A40E-D8AA-7DECB8391688}"/>
+                </a:ext>
+              </a:extLst>
+            </p:cNvPr>
+            <p:cNvCxnSpPr>
+              <a:cxnSpLocks/>
+              <a:stCxn id="159" idx="3"/>
+              <a:endCxn id="123" idx="1"/>
+            </p:cNvCxnSpPr>
+            <p:nvPr/>
+          </p:nvCxnSpPr>
+          <p:spPr>
+            <a:xfrm flipV="1">
+              <a:off x="6539770" y="3523962"/>
+              <a:ext cx="481073" cy="283831"/>
+            </a:xfrm>
+            <a:prstGeom prst="bentConnector3">
+              <a:avLst>
+                <a:gd name="adj1" fmla="val 50000"/>
+              </a:avLst>
+            </a:prstGeom>
+            <a:ln w="19050" cap="flat" cmpd="sng" algn="ctr">
+              <a:solidFill>
+                <a:schemeClr val="dk1"/>
+              </a:solidFill>
+              <a:prstDash val="solid"/>
+              <a:round/>
+              <a:headEnd type="none" w="med" len="med"/>
+              <a:tailEnd type="arrow" w="med" len="med"/>
+            </a:ln>
+          </p:spPr>
+          <p:style>
+            <a:lnRef idx="0">
+              <a:scrgbClr r="0" g="0" b="0"/>
+            </a:lnRef>
+            <a:fillRef idx="0">
+              <a:scrgbClr r="0" g="0" b="0"/>
+            </a:fillRef>
+            <a:effectRef idx="0">
+              <a:scrgbClr r="0" g="0" b="0"/>
+            </a:effectRef>
+            <a:fontRef idx="minor">
+              <a:schemeClr val="tx1"/>
+            </a:fontRef>
+          </p:style>
+        </p:cxnSp>
+        <p:sp>
+          <p:nvSpPr>
+            <p:cNvPr id="252" name="TextBox 251">
+              <a:extLst>
+                <a:ext uri="{FF2B5EF4-FFF2-40B4-BE49-F238E27FC236}">
+                  <a16:creationId xmlns:a16="http://schemas.microsoft.com/office/drawing/2014/main" id="{5A1B7C83-BD19-672F-14A1-0351AE1B5832}"/>
+                </a:ext>
+              </a:extLst>
+            </p:cNvPr>
+            <p:cNvSpPr txBox="1"/>
+            <p:nvPr/>
+          </p:nvSpPr>
+          <p:spPr>
+            <a:xfrm>
+              <a:off x="6570966" y="2926708"/>
+              <a:ext cx="1492716" cy="338554"/>
+            </a:xfrm>
+            <a:prstGeom prst="rect">
+              <a:avLst/>
+            </a:prstGeom>
+            <a:noFill/>
+          </p:spPr>
+          <p:txBody>
+            <a:bodyPr wrap="none" rtlCol="0">
+              <a:spAutoFit/>
+            </a:bodyPr>
+            <a:lstStyle/>
+            <a:p>
+              <a:r>
+                <a:rPr lang="en-NZ" sz="800" dirty="0"/>
+                <a:t>+ Traces/Crashes/Measures</a:t>
+              </a:r>
+            </a:p>
+            <a:p>
+              <a:r>
+                <a:rPr lang="en-NZ" sz="800" dirty="0"/>
+                <a:t>Audits/Usages</a:t>
+              </a:r>
+            </a:p>
+          </p:txBody>
+        </p:sp>
+        <p:sp>
+          <p:nvSpPr>
+            <p:cNvPr id="254" name="TextBox 253">
+              <a:extLst>
+                <a:ext uri="{FF2B5EF4-FFF2-40B4-BE49-F238E27FC236}">
+                  <a16:creationId xmlns:a16="http://schemas.microsoft.com/office/drawing/2014/main" id="{BF70E56B-28EE-371C-D03E-43BF4B66FF5A}"/>
+                </a:ext>
+              </a:extLst>
+            </p:cNvPr>
+            <p:cNvSpPr txBox="1"/>
+            <p:nvPr/>
+          </p:nvSpPr>
+          <p:spPr>
+            <a:xfrm>
+              <a:off x="6555093" y="3839070"/>
+              <a:ext cx="1103187" cy="215444"/>
+            </a:xfrm>
+            <a:prstGeom prst="rect">
+              <a:avLst/>
+            </a:prstGeom>
+            <a:noFill/>
+          </p:spPr>
+          <p:txBody>
+            <a:bodyPr wrap="none" rtlCol="0">
+              <a:spAutoFit/>
+            </a:bodyPr>
+            <a:lstStyle/>
+            <a:p>
+              <a:r>
+                <a:rPr lang="en-NZ" sz="800" dirty="0"/>
+                <a:t>+ Usages/Measures</a:t>
+              </a:r>
+            </a:p>
+          </p:txBody>
+        </p:sp>
+      </p:grpSp>
+      <p:cxnSp>
+        <p:nvCxnSpPr>
+          <p:cNvPr id="28" name="Straight Arrow Connector 29">
+            <a:extLst>
+              <a:ext uri="{FF2B5EF4-FFF2-40B4-BE49-F238E27FC236}">
+                <a16:creationId xmlns:a16="http://schemas.microsoft.com/office/drawing/2014/main" id="{2487AE29-09FA-E0B9-3624-FBE19DED6341}"/>
+              </a:ext>
+            </a:extLst>
+          </p:cNvPr>
+          <p:cNvCxnSpPr>
+            <a:cxnSpLocks/>
+            <a:stCxn id="33" idx="3"/>
+            <a:endCxn id="123" idx="3"/>
+          </p:cNvCxnSpPr>
+          <p:nvPr/>
+        </p:nvCxnSpPr>
+        <p:spPr>
+          <a:xfrm flipH="1">
+            <a:off x="8190776" y="3220028"/>
+            <a:ext cx="696265" cy="1517095"/>
+          </a:xfrm>
+          <a:prstGeom prst="straightConnector1">
+            <a:avLst/>
+          </a:prstGeom>
+          <a:ln w="19050" cap="flat" cmpd="sng" algn="ctr">
+            <a:solidFill>
+              <a:schemeClr val="bg2">
+                <a:lumMod val="50000"/>
+              </a:schemeClr>
+            </a:solidFill>
+            <a:prstDash val="solid"/>
+            <a:round/>
+            <a:headEnd type="arrow" w="med" len="med"/>
+            <a:tailEnd type="none" w="med" len="med"/>
+          </a:ln>
+        </p:spPr>
+        <p:style>
+          <a:lnRef idx="0">
+            <a:scrgbClr r="0" g="0" b="0"/>
+          </a:lnRef>
+          <a:fillRef idx="0">
+            <a:scrgbClr r="0" g="0" b="0"/>
+          </a:fillRef>
+          <a:effectRef idx="0">
+            <a:scrgbClr r="0" g="0" b="0"/>
+          </a:effectRef>
+          <a:fontRef idx="minor">
+            <a:schemeClr val="tx1"/>
+          </a:fontRef>
+        </p:style>
+      </p:cxnSp>
+      <p:grpSp>
+        <p:nvGrpSpPr>
+          <p:cNvPr id="284" name="Group 283">
+            <a:extLst>
+              <a:ext uri="{FF2B5EF4-FFF2-40B4-BE49-F238E27FC236}">
+                <a16:creationId xmlns:a16="http://schemas.microsoft.com/office/drawing/2014/main" id="{8C982128-8DBE-1C9F-C7FB-CB8174C42D94}"/>
+              </a:ext>
+            </a:extLst>
+          </p:cNvPr>
+          <p:cNvGrpSpPr/>
+          <p:nvPr/>
+        </p:nvGrpSpPr>
+        <p:grpSpPr>
+          <a:xfrm>
+            <a:off x="5130763" y="644768"/>
+            <a:ext cx="3216561" cy="1886135"/>
+            <a:chOff x="5142446" y="57977"/>
+            <a:chExt cx="3216561" cy="1886135"/>
+          </a:xfrm>
+        </p:grpSpPr>
+        <p:grpSp>
+          <p:nvGrpSpPr>
+            <p:cNvPr id="259" name="Group 258">
+              <a:extLst>
+                <a:ext uri="{FF2B5EF4-FFF2-40B4-BE49-F238E27FC236}">
+                  <a16:creationId xmlns:a16="http://schemas.microsoft.com/office/drawing/2014/main" id="{746E4B18-59E7-1CA5-4EDD-D708F44E310A}"/>
+                </a:ext>
+              </a:extLst>
+            </p:cNvPr>
+            <p:cNvGrpSpPr/>
+            <p:nvPr/>
+          </p:nvGrpSpPr>
+          <p:grpSpPr>
+            <a:xfrm>
+              <a:off x="5142446" y="57977"/>
+              <a:ext cx="3216561" cy="1886135"/>
+              <a:chOff x="2698105" y="3204587"/>
+              <a:chExt cx="3216561" cy="1886135"/>
+            </a:xfrm>
+          </p:grpSpPr>
+          <p:sp>
+            <p:nvSpPr>
+              <p:cNvPr id="263" name="Rectangle: Rounded Corners 262">
+                <a:extLst>
+                  <a:ext uri="{FF2B5EF4-FFF2-40B4-BE49-F238E27FC236}">
+                    <a16:creationId xmlns:a16="http://schemas.microsoft.com/office/drawing/2014/main" id="{319EF625-F8BA-44B1-613A-AF4A23B0597C}"/>
+                  </a:ext>
+                </a:extLst>
+              </p:cNvPr>
+              <p:cNvSpPr/>
+              <p:nvPr/>
+            </p:nvSpPr>
+            <p:spPr>
+              <a:xfrm>
+                <a:off x="2698105" y="3204587"/>
+                <a:ext cx="3216561" cy="1886135"/>
+              </a:xfrm>
+              <a:prstGeom prst="roundRect">
+                <a:avLst>
+                  <a:gd name="adj" fmla="val 5101"/>
+                </a:avLst>
+              </a:prstGeom>
+              <a:solidFill>
+                <a:srgbClr val="0078D7"/>
+              </a:solidFill>
+            </p:spPr>
+            <p:style>
+              <a:lnRef idx="2">
+                <a:schemeClr val="accent1">
+                  <a:shade val="50000"/>
+                </a:schemeClr>
+              </a:lnRef>
+              <a:fillRef idx="1">
+                <a:schemeClr val="accent1"/>
+              </a:fillRef>
+              <a:effectRef idx="0">
+                <a:schemeClr val="accent1"/>
+              </a:effectRef>
+              <a:fontRef idx="minor">
+                <a:schemeClr val="lt1"/>
+              </a:fontRef>
+            </p:style>
+            <p:txBody>
+              <a:bodyPr rtlCol="0" anchor="b"/>
+              <a:lstStyle/>
+              <a:p>
+                <a:r>
+                  <a:rPr lang="en-US" sz="1200" dirty="0"/>
+                  <a:t>              Backend 4FrontEnd Host</a:t>
+                </a:r>
+              </a:p>
+            </p:txBody>
+          </p:sp>
+          <p:sp>
+            <p:nvSpPr>
+              <p:cNvPr id="264" name="Rectangle 263">
+                <a:extLst>
+                  <a:ext uri="{FF2B5EF4-FFF2-40B4-BE49-F238E27FC236}">
+                    <a16:creationId xmlns:a16="http://schemas.microsoft.com/office/drawing/2014/main" id="{26B2E57F-F4F3-8BFB-5050-AFB4A01591EB}"/>
+                  </a:ext>
+                </a:extLst>
+              </p:cNvPr>
+              <p:cNvSpPr/>
+              <p:nvPr/>
+            </p:nvSpPr>
+            <p:spPr>
+              <a:xfrm>
+                <a:off x="3001084" y="3526720"/>
+                <a:ext cx="1039660" cy="379857"/>
+              </a:xfrm>
+              <a:prstGeom prst="rect">
+                <a:avLst/>
+              </a:prstGeom>
+            </p:spPr>
+            <p:style>
+              <a:lnRef idx="2">
+                <a:schemeClr val="accent1">
+                  <a:shade val="50000"/>
+                </a:schemeClr>
+              </a:lnRef>
+              <a:fillRef idx="1">
+                <a:schemeClr val="accent1"/>
+              </a:fillRef>
+              <a:effectRef idx="0">
+                <a:schemeClr val="accent1"/>
+              </a:effectRef>
+              <a:fontRef idx="minor">
+                <a:schemeClr val="lt1"/>
+              </a:fontRef>
+            </p:style>
+            <p:txBody>
+              <a:bodyPr rtlCol="0" anchor="ctr"/>
+              <a:lstStyle/>
+              <a:p>
+                <a:pPr algn="ctr"/>
+                <a:r>
+                  <a:rPr lang="en-US" sz="1200" dirty="0"/>
+                  <a:t>Any APIs</a:t>
+                </a:r>
+                <a:endParaRPr lang="en-NZ" sz="1200" dirty="0"/>
+              </a:p>
+            </p:txBody>
+          </p:sp>
+          <p:pic>
+            <p:nvPicPr>
+              <p:cNvPr id="265" name="Picture 8" descr="App Service - Web App | Microsoft Azure Mono">
+                <a:extLst>
+                  <a:ext uri="{FF2B5EF4-FFF2-40B4-BE49-F238E27FC236}">
+                    <a16:creationId xmlns:a16="http://schemas.microsoft.com/office/drawing/2014/main" id="{CF771138-2DD8-8859-11CD-D2B0378D640D}"/>
+                  </a:ext>
+                </a:extLst>
+              </p:cNvPr>
+              <p:cNvPicPr>
+                <a:picLocks noChangeAspect="1" noChangeArrowheads="1"/>
+              </p:cNvPicPr>
+              <p:nvPr/>
+            </p:nvPicPr>
+            <p:blipFill>
+              <a:blip r:embed="rId10">
+                <a:extLst>
+                  <a:ext uri="{28A0092B-C50C-407E-A947-70E740481C1C}">
+                    <a14:useLocalDpi xmlns:a14="http://schemas.microsoft.com/office/drawing/2010/main" val="0"/>
+                  </a:ext>
+                </a:extLst>
+              </a:blip>
+              <a:srcRect/>
+              <a:stretch>
+                <a:fillRect/>
+              </a:stretch>
+            </p:blipFill>
+            <p:spPr bwMode="auto">
+              <a:xfrm>
+                <a:off x="2778776" y="4550527"/>
+                <a:ext cx="450277" cy="417367"/>
+              </a:xfrm>
+              <a:prstGeom prst="rect">
+                <a:avLst/>
+              </a:prstGeom>
+              <a:noFill/>
+              <a:extLst>
+                <a:ext uri="{909E8E84-426E-40DD-AFC4-6F175D3DCCD1}">
+                  <a14:hiddenFill xmlns:a14="http://schemas.microsoft.com/office/drawing/2010/main">
+                    <a:solidFill>
+                      <a:srgbClr val="FFFFFF"/>
+                    </a:solidFill>
+                  </a14:hiddenFill>
+                </a:ext>
+              </a:extLst>
+            </p:spPr>
+          </p:pic>
+        </p:grpSp>
+        <p:sp>
+          <p:nvSpPr>
+            <p:cNvPr id="260" name="Rectangle 259">
+              <a:extLst>
+                <a:ext uri="{FF2B5EF4-FFF2-40B4-BE49-F238E27FC236}">
+                  <a16:creationId xmlns:a16="http://schemas.microsoft.com/office/drawing/2014/main" id="{6E57702C-3BBF-5565-E964-DBD93FC9F045}"/>
+                </a:ext>
+              </a:extLst>
+            </p:cNvPr>
+            <p:cNvSpPr/>
+            <p:nvPr/>
+          </p:nvSpPr>
+          <p:spPr>
+            <a:xfrm>
+              <a:off x="6858637" y="644188"/>
+              <a:ext cx="1169933" cy="306177"/>
+            </a:xfrm>
+            <a:prstGeom prst="rect">
+              <a:avLst/>
+            </a:prstGeom>
+            <a:solidFill>
+              <a:schemeClr val="accent5">
+                <a:lumMod val="60000"/>
+                <a:lumOff val="40000"/>
+              </a:schemeClr>
+            </a:solidFill>
+            <a:ln>
+              <a:prstDash val="sysDash"/>
+            </a:ln>
+          </p:spPr>
+          <p:style>
+            <a:lnRef idx="2">
+              <a:schemeClr val="accent1">
+                <a:shade val="50000"/>
+              </a:schemeClr>
+            </a:lnRef>
+            <a:fillRef idx="1">
+              <a:schemeClr val="accent1"/>
+            </a:fillRef>
+            <a:effectRef idx="0">
+              <a:schemeClr val="accent1"/>
+            </a:effectRef>
+            <a:fontRef idx="minor">
+              <a:schemeClr val="lt1"/>
+            </a:fontRef>
+          </p:style>
+          <p:txBody>
+            <a:bodyPr rtlCol="0" anchor="ctr"/>
+            <a:lstStyle/>
+            <a:p>
+              <a:pPr algn="ctr"/>
+              <a:r>
+                <a:rPr lang="en-US" sz="1200" dirty="0" err="1">
+                  <a:solidFill>
+                    <a:schemeClr val="tx1"/>
+                  </a:solidFill>
+                </a:rPr>
+                <a:t>HostRecorder</a:t>
+              </a:r>
+              <a:endParaRPr lang="en-NZ" sz="1200" dirty="0">
+                <a:solidFill>
+                  <a:schemeClr val="tx1"/>
+                </a:solidFill>
+              </a:endParaRPr>
+            </a:p>
+          </p:txBody>
+        </p:sp>
+        <p:cxnSp>
+          <p:nvCxnSpPr>
+            <p:cNvPr id="261" name="Straight Arrow Connector 38">
+              <a:extLst>
+                <a:ext uri="{FF2B5EF4-FFF2-40B4-BE49-F238E27FC236}">
+                  <a16:creationId xmlns:a16="http://schemas.microsoft.com/office/drawing/2014/main" id="{328F0A6B-32E4-87C4-D3CD-3630061280E6}"/>
+                </a:ext>
+              </a:extLst>
+            </p:cNvPr>
+            <p:cNvCxnSpPr>
+              <a:cxnSpLocks/>
+              <a:stCxn id="264" idx="3"/>
+              <a:endCxn id="260" idx="1"/>
+            </p:cNvCxnSpPr>
+            <p:nvPr/>
+          </p:nvCxnSpPr>
+          <p:spPr>
+            <a:xfrm>
+              <a:off x="6485085" y="570039"/>
+              <a:ext cx="373552" cy="227238"/>
+            </a:xfrm>
+            <a:prstGeom prst="bentConnector3">
+              <a:avLst>
+                <a:gd name="adj1" fmla="val 50000"/>
+              </a:avLst>
+            </a:prstGeom>
+            <a:ln w="19050" cap="flat" cmpd="sng" algn="ctr">
+              <a:solidFill>
+                <a:schemeClr val="dk1"/>
+              </a:solidFill>
+              <a:prstDash val="solid"/>
+              <a:round/>
+              <a:headEnd type="none" w="med" len="med"/>
+              <a:tailEnd type="arrow" w="med" len="med"/>
+            </a:ln>
+          </p:spPr>
+          <p:style>
+            <a:lnRef idx="0">
+              <a:scrgbClr r="0" g="0" b="0"/>
+            </a:lnRef>
+            <a:fillRef idx="0">
+              <a:scrgbClr r="0" g="0" b="0"/>
+            </a:fillRef>
+            <a:effectRef idx="0">
+              <a:scrgbClr r="0" g="0" b="0"/>
+            </a:effectRef>
+            <a:fontRef idx="minor">
+              <a:schemeClr val="tx1"/>
+            </a:fontRef>
+          </p:style>
+        </p:cxnSp>
+        <p:sp>
+          <p:nvSpPr>
+            <p:cNvPr id="262" name="TextBox 261">
+              <a:extLst>
+                <a:ext uri="{FF2B5EF4-FFF2-40B4-BE49-F238E27FC236}">
+                  <a16:creationId xmlns:a16="http://schemas.microsoft.com/office/drawing/2014/main" id="{33E55B85-0DC0-89C2-4352-877FA9B9CBF4}"/>
+                </a:ext>
+              </a:extLst>
+            </p:cNvPr>
+            <p:cNvSpPr txBox="1"/>
+            <p:nvPr/>
+          </p:nvSpPr>
+          <p:spPr>
+            <a:xfrm>
+              <a:off x="6453817" y="90120"/>
+              <a:ext cx="1492716" cy="338554"/>
+            </a:xfrm>
+            <a:prstGeom prst="rect">
+              <a:avLst/>
+            </a:prstGeom>
+            <a:noFill/>
+          </p:spPr>
+          <p:txBody>
+            <a:bodyPr wrap="none" rtlCol="0">
+              <a:spAutoFit/>
+            </a:bodyPr>
+            <a:lstStyle/>
+            <a:p>
+              <a:r>
+                <a:rPr lang="en-NZ" sz="800" dirty="0"/>
+                <a:t>+ Traces/Crashes/Measures</a:t>
+              </a:r>
+            </a:p>
+            <a:p>
+              <a:r>
+                <a:rPr lang="en-NZ" sz="800" dirty="0"/>
+                <a:t>Audits/Usages</a:t>
+              </a:r>
+            </a:p>
+          </p:txBody>
+        </p:sp>
+        <p:sp>
+          <p:nvSpPr>
+            <p:cNvPr id="26" name="Rectangle 25">
+              <a:extLst>
+                <a:ext uri="{FF2B5EF4-FFF2-40B4-BE49-F238E27FC236}">
+                  <a16:creationId xmlns:a16="http://schemas.microsoft.com/office/drawing/2014/main" id="{D43614FB-F9BE-49F3-C0F7-9FF74A2F24AC}"/>
+                </a:ext>
+              </a:extLst>
+            </p:cNvPr>
+            <p:cNvSpPr/>
+            <p:nvPr/>
+          </p:nvSpPr>
+          <p:spPr>
+            <a:xfrm>
+              <a:off x="5445425" y="864717"/>
+              <a:ext cx="1039660" cy="379857"/>
+            </a:xfrm>
+            <a:prstGeom prst="rect">
+              <a:avLst/>
+            </a:prstGeom>
+          </p:spPr>
+          <p:style>
+            <a:lnRef idx="2">
+              <a:schemeClr val="accent1">
+                <a:shade val="50000"/>
+              </a:schemeClr>
+            </a:lnRef>
+            <a:fillRef idx="1">
+              <a:schemeClr val="accent1"/>
+            </a:fillRef>
+            <a:effectRef idx="0">
+              <a:schemeClr val="accent1"/>
+            </a:effectRef>
+            <a:fontRef idx="minor">
+              <a:schemeClr val="lt1"/>
+            </a:fontRef>
+          </p:style>
+          <p:txBody>
+            <a:bodyPr rtlCol="0" anchor="ctr"/>
+            <a:lstStyle/>
+            <a:p>
+              <a:pPr algn="ctr"/>
+              <a:r>
+                <a:rPr lang="en-US" sz="1200" dirty="0"/>
+                <a:t>Recording API</a:t>
+              </a:r>
+              <a:endParaRPr lang="en-NZ" sz="1200" dirty="0"/>
+            </a:p>
+          </p:txBody>
+        </p:sp>
+        <p:cxnSp>
+          <p:nvCxnSpPr>
+            <p:cNvPr id="281" name="Straight Arrow Connector 38">
+              <a:extLst>
+                <a:ext uri="{FF2B5EF4-FFF2-40B4-BE49-F238E27FC236}">
+                  <a16:creationId xmlns:a16="http://schemas.microsoft.com/office/drawing/2014/main" id="{CEE99303-E3E8-4070-89F7-4A6B46023D6F}"/>
+                </a:ext>
+              </a:extLst>
+            </p:cNvPr>
+            <p:cNvCxnSpPr>
+              <a:cxnSpLocks/>
+              <a:stCxn id="26" idx="3"/>
+              <a:endCxn id="260" idx="1"/>
+            </p:cNvCxnSpPr>
+            <p:nvPr/>
+          </p:nvCxnSpPr>
+          <p:spPr>
+            <a:xfrm flipV="1">
+              <a:off x="6485085" y="797277"/>
+              <a:ext cx="373552" cy="257369"/>
+            </a:xfrm>
+            <a:prstGeom prst="bentConnector3">
+              <a:avLst>
+                <a:gd name="adj1" fmla="val 50000"/>
+              </a:avLst>
+            </a:prstGeom>
+            <a:ln w="19050" cap="flat" cmpd="sng" algn="ctr">
+              <a:solidFill>
+                <a:schemeClr val="dk1"/>
+              </a:solidFill>
+              <a:prstDash val="solid"/>
+              <a:round/>
+              <a:headEnd type="none" w="med" len="med"/>
+              <a:tailEnd type="arrow" w="med" len="med"/>
+            </a:ln>
+          </p:spPr>
+          <p:style>
+            <a:lnRef idx="0">
+              <a:scrgbClr r="0" g="0" b="0"/>
+            </a:lnRef>
+            <a:fillRef idx="0">
+              <a:scrgbClr r="0" g="0" b="0"/>
+            </a:fillRef>
+            <a:effectRef idx="0">
+              <a:scrgbClr r="0" g="0" b="0"/>
+            </a:effectRef>
+            <a:fontRef idx="minor">
+              <a:schemeClr val="tx1"/>
+            </a:fontRef>
+          </p:style>
+        </p:cxnSp>
+      </p:grpSp>
+      <p:cxnSp>
+        <p:nvCxnSpPr>
+          <p:cNvPr id="41" name="Straight Arrow Connector 38">
+            <a:extLst>
+              <a:ext uri="{FF2B5EF4-FFF2-40B4-BE49-F238E27FC236}">
+                <a16:creationId xmlns:a16="http://schemas.microsoft.com/office/drawing/2014/main" id="{E6623D6C-8E4F-C492-4177-BAFC0DFC10CC}"/>
+              </a:ext>
+            </a:extLst>
+          </p:cNvPr>
+          <p:cNvCxnSpPr>
+            <a:cxnSpLocks/>
+            <a:stCxn id="19" idx="3"/>
+            <a:endCxn id="26" idx="1"/>
+          </p:cNvCxnSpPr>
+          <p:nvPr/>
+        </p:nvCxnSpPr>
+        <p:spPr>
+          <a:xfrm flipV="1">
+            <a:off x="3131778" y="1641437"/>
+            <a:ext cx="2301964" cy="4255"/>
+          </a:xfrm>
+          <a:prstGeom prst="bentConnector3">
+            <a:avLst>
+              <a:gd name="adj1" fmla="val 50000"/>
+            </a:avLst>
+          </a:prstGeom>
+          <a:ln w="19050" cap="flat" cmpd="sng" algn="ctr">
+            <a:solidFill>
+              <a:schemeClr val="dk1"/>
+            </a:solidFill>
+            <a:prstDash val="solid"/>
+            <a:round/>
+            <a:headEnd type="none" w="med" len="med"/>
+            <a:tailEnd type="arrow" w="med" len="med"/>
+          </a:ln>
+        </p:spPr>
+        <p:style>
+          <a:lnRef idx="0">
+            <a:scrgbClr r="0" g="0" b="0"/>
+          </a:lnRef>
+          <a:fillRef idx="0">
+            <a:scrgbClr r="0" g="0" b="0"/>
+          </a:fillRef>
+          <a:effectRef idx="0">
+            <a:scrgbClr r="0" g="0" b="0"/>
+          </a:effectRef>
+          <a:fontRef idx="minor">
+            <a:schemeClr val="tx1"/>
+          </a:fontRef>
+        </p:style>
+      </p:cxnSp>
+      <p:cxnSp>
+        <p:nvCxnSpPr>
+          <p:cNvPr id="63" name="Straight Arrow Connector 29">
+            <a:extLst>
+              <a:ext uri="{FF2B5EF4-FFF2-40B4-BE49-F238E27FC236}">
+                <a16:creationId xmlns:a16="http://schemas.microsoft.com/office/drawing/2014/main" id="{D253527E-4D96-7836-BDCE-B942CD4E4131}"/>
+              </a:ext>
+            </a:extLst>
+          </p:cNvPr>
+          <p:cNvCxnSpPr>
+            <a:cxnSpLocks/>
+            <a:stCxn id="53" idx="1"/>
+            <a:endCxn id="66" idx="3"/>
+          </p:cNvCxnSpPr>
+          <p:nvPr/>
+        </p:nvCxnSpPr>
+        <p:spPr>
+          <a:xfrm rot="10800000" flipH="1">
+            <a:off x="5301996" y="3220026"/>
+            <a:ext cx="5816357" cy="2365293"/>
+          </a:xfrm>
+          <a:prstGeom prst="bentConnector5">
+            <a:avLst>
+              <a:gd name="adj1" fmla="val -7043"/>
+              <a:gd name="adj2" fmla="val -49415"/>
+              <a:gd name="adj3" fmla="val 103930"/>
+            </a:avLst>
+          </a:prstGeom>
+          <a:ln w="19050" cap="flat" cmpd="sng" algn="ctr">
+            <a:solidFill>
+              <a:schemeClr val="dk1"/>
+            </a:solidFill>
+            <a:prstDash val="dash"/>
+            <a:round/>
+            <a:headEnd type="arrow" w="med" len="med"/>
+            <a:tailEnd type="none" w="med" len="med"/>
+          </a:ln>
+        </p:spPr>
+        <p:style>
+          <a:lnRef idx="0">
+            <a:scrgbClr r="0" g="0" b="0"/>
+          </a:lnRef>
+          <a:fillRef idx="0">
+            <a:scrgbClr r="0" g="0" b="0"/>
+          </a:fillRef>
+          <a:effectRef idx="0">
+            <a:scrgbClr r="0" g="0" b="0"/>
+          </a:effectRef>
+          <a:fontRef idx="minor">
+            <a:schemeClr val="tx1"/>
+          </a:fontRef>
+        </p:style>
+      </p:cxnSp>
+      <p:cxnSp>
+        <p:nvCxnSpPr>
+          <p:cNvPr id="139" name="Straight Arrow Connector 29">
+            <a:extLst>
+              <a:ext uri="{FF2B5EF4-FFF2-40B4-BE49-F238E27FC236}">
+                <a16:creationId xmlns:a16="http://schemas.microsoft.com/office/drawing/2014/main" id="{3EC017AA-BD93-8925-1729-39C301932929}"/>
+              </a:ext>
+            </a:extLst>
+          </p:cNvPr>
+          <p:cNvCxnSpPr>
+            <a:cxnSpLocks/>
+            <a:stCxn id="132" idx="1"/>
+            <a:endCxn id="53" idx="3"/>
+          </p:cNvCxnSpPr>
+          <p:nvPr/>
+        </p:nvCxnSpPr>
+        <p:spPr>
+          <a:xfrm rot="10800000" flipV="1">
+            <a:off x="6523839" y="4243020"/>
+            <a:ext cx="2670162" cy="1342298"/>
+          </a:xfrm>
+          <a:prstGeom prst="bentConnector3">
+            <a:avLst>
+              <a:gd name="adj1" fmla="val 9652"/>
+            </a:avLst>
+          </a:prstGeom>
+          <a:ln w="19050" cap="flat" cmpd="sng" algn="ctr">
+            <a:solidFill>
+              <a:schemeClr val="bg2">
+                <a:lumMod val="50000"/>
+              </a:schemeClr>
+            </a:solidFill>
+            <a:prstDash val="solid"/>
+            <a:round/>
+            <a:headEnd type="arrow" w="med" len="med"/>
+            <a:tailEnd type="none" w="med" len="med"/>
+          </a:ln>
+        </p:spPr>
+        <p:style>
+          <a:lnRef idx="0">
+            <a:scrgbClr r="0" g="0" b="0"/>
+          </a:lnRef>
+          <a:fillRef idx="0">
+            <a:scrgbClr r="0" g="0" b="0"/>
+          </a:fillRef>
+          <a:effectRef idx="0">
+            <a:scrgbClr r="0" g="0" b="0"/>
+          </a:effectRef>
+          <a:fontRef idx="minor">
+            <a:schemeClr val="tx1"/>
+          </a:fontRef>
+        </p:style>
+      </p:cxnSp>
+      <p:cxnSp>
+        <p:nvCxnSpPr>
+          <p:cNvPr id="108" name="Straight Arrow Connector 29">
+            <a:extLst>
+              <a:ext uri="{FF2B5EF4-FFF2-40B4-BE49-F238E27FC236}">
+                <a16:creationId xmlns:a16="http://schemas.microsoft.com/office/drawing/2014/main" id="{668DD861-FCE8-C55C-0E2C-DD55DFDA929C}"/>
+              </a:ext>
+            </a:extLst>
+          </p:cNvPr>
+          <p:cNvCxnSpPr>
+            <a:cxnSpLocks/>
+            <a:stCxn id="102" idx="1"/>
+            <a:endCxn id="53" idx="3"/>
+          </p:cNvCxnSpPr>
+          <p:nvPr/>
+        </p:nvCxnSpPr>
+        <p:spPr>
+          <a:xfrm rot="10800000">
+            <a:off x="6523839" y="5585319"/>
+            <a:ext cx="3483502" cy="153819"/>
+          </a:xfrm>
+          <a:prstGeom prst="bentConnector3">
+            <a:avLst>
+              <a:gd name="adj1" fmla="val 23491"/>
+            </a:avLst>
+          </a:prstGeom>
+          <a:ln w="19050" cap="flat" cmpd="sng" algn="ctr">
+            <a:solidFill>
+              <a:schemeClr val="bg2">
+                <a:lumMod val="50000"/>
+              </a:schemeClr>
+            </a:solidFill>
+            <a:prstDash val="solid"/>
+            <a:round/>
+            <a:headEnd type="arrow" w="med" len="med"/>
+            <a:tailEnd type="none" w="med" len="med"/>
+          </a:ln>
+        </p:spPr>
+        <p:style>
+          <a:lnRef idx="0">
+            <a:scrgbClr r="0" g="0" b="0"/>
+          </a:lnRef>
+          <a:fillRef idx="0">
+            <a:scrgbClr r="0" g="0" b="0"/>
+          </a:fillRef>
+          <a:effectRef idx="0">
+            <a:scrgbClr r="0" g="0" b="0"/>
+          </a:effectRef>
+          <a:fontRef idx="minor">
+            <a:schemeClr val="tx1"/>
+          </a:fontRef>
+        </p:style>
+      </p:cxnSp>
+      <p:cxnSp>
+        <p:nvCxnSpPr>
+          <p:cNvPr id="100" name="Straight Arrow Connector 29">
+            <a:extLst>
+              <a:ext uri="{FF2B5EF4-FFF2-40B4-BE49-F238E27FC236}">
+                <a16:creationId xmlns:a16="http://schemas.microsoft.com/office/drawing/2014/main" id="{03149885-B8D0-9C60-4BDF-B4173499ECCA}"/>
+              </a:ext>
+            </a:extLst>
+          </p:cNvPr>
+          <p:cNvCxnSpPr>
+            <a:cxnSpLocks/>
+            <a:stCxn id="2" idx="1"/>
+            <a:endCxn id="123" idx="3"/>
+          </p:cNvCxnSpPr>
+          <p:nvPr/>
+        </p:nvCxnSpPr>
+        <p:spPr>
+          <a:xfrm flipH="1">
+            <a:off x="8190776" y="2046924"/>
+            <a:ext cx="1003225" cy="2690199"/>
+          </a:xfrm>
+          <a:prstGeom prst="straightConnector1">
+            <a:avLst/>
+          </a:prstGeom>
+          <a:ln w="19050" cap="flat" cmpd="sng" algn="ctr">
+            <a:solidFill>
+              <a:schemeClr val="bg2">
+                <a:lumMod val="50000"/>
+              </a:schemeClr>
+            </a:solidFill>
+            <a:prstDash val="solid"/>
+            <a:round/>
+            <a:headEnd type="arrow" w="med" len="med"/>
+            <a:tailEnd type="none" w="med" len="med"/>
+          </a:ln>
+        </p:spPr>
+        <p:style>
+          <a:lnRef idx="0">
+            <a:scrgbClr r="0" g="0" b="0"/>
+          </a:lnRef>
+          <a:fillRef idx="0">
+            <a:scrgbClr r="0" g="0" b="0"/>
+          </a:fillRef>
+          <a:effectRef idx="0">
+            <a:scrgbClr r="0" g="0" b="0"/>
+          </a:effectRef>
+          <a:fontRef idx="minor">
+            <a:schemeClr val="tx1"/>
+          </a:fontRef>
+        </p:style>
+      </p:cxnSp>
+      <p:cxnSp>
+        <p:nvCxnSpPr>
+          <p:cNvPr id="186" name="Straight Arrow Connector 29">
+            <a:extLst>
+              <a:ext uri="{FF2B5EF4-FFF2-40B4-BE49-F238E27FC236}">
+                <a16:creationId xmlns:a16="http://schemas.microsoft.com/office/drawing/2014/main" id="{ED94095D-AB74-930E-400E-F66A9ADEE52D}"/>
+              </a:ext>
+            </a:extLst>
+          </p:cNvPr>
+          <p:cNvCxnSpPr>
+            <a:cxnSpLocks/>
+            <a:stCxn id="2" idx="1"/>
+            <a:endCxn id="182" idx="3"/>
+          </p:cNvCxnSpPr>
+          <p:nvPr/>
+        </p:nvCxnSpPr>
+        <p:spPr>
+          <a:xfrm flipH="1">
+            <a:off x="8028571" y="2046924"/>
+            <a:ext cx="1165430" cy="1132467"/>
+          </a:xfrm>
+          <a:prstGeom prst="straightConnector1">
+            <a:avLst/>
+          </a:prstGeom>
+          <a:ln w="19050" cap="flat" cmpd="sng" algn="ctr">
+            <a:solidFill>
+              <a:schemeClr val="bg2">
+                <a:lumMod val="50000"/>
+              </a:schemeClr>
+            </a:solidFill>
+            <a:prstDash val="solid"/>
+            <a:round/>
+            <a:headEnd type="arrow" w="med" len="med"/>
+            <a:tailEnd type="none" w="med" len="med"/>
+          </a:ln>
+        </p:spPr>
+        <p:style>
+          <a:lnRef idx="0">
+            <a:scrgbClr r="0" g="0" b="0"/>
+          </a:lnRef>
+          <a:fillRef idx="0">
+            <a:scrgbClr r="0" g="0" b="0"/>
+          </a:fillRef>
+          <a:effectRef idx="0">
+            <a:scrgbClr r="0" g="0" b="0"/>
+          </a:effectRef>
+          <a:fontRef idx="minor">
+            <a:schemeClr val="tx1"/>
+          </a:fontRef>
+        </p:style>
+      </p:cxnSp>
+      <p:cxnSp>
+        <p:nvCxnSpPr>
+          <p:cNvPr id="189" name="Straight Arrow Connector 29">
+            <a:extLst>
+              <a:ext uri="{FF2B5EF4-FFF2-40B4-BE49-F238E27FC236}">
+                <a16:creationId xmlns:a16="http://schemas.microsoft.com/office/drawing/2014/main" id="{21B5DBA8-B914-6BD0-2686-C3FA13FA4D4A}"/>
+              </a:ext>
+            </a:extLst>
+          </p:cNvPr>
+          <p:cNvCxnSpPr>
+            <a:cxnSpLocks/>
+            <a:stCxn id="33" idx="3"/>
+            <a:endCxn id="182" idx="3"/>
+          </p:cNvCxnSpPr>
+          <p:nvPr/>
+        </p:nvCxnSpPr>
+        <p:spPr>
+          <a:xfrm flipH="1" flipV="1">
+            <a:off x="8028571" y="3179391"/>
+            <a:ext cx="858470" cy="40637"/>
+          </a:xfrm>
+          <a:prstGeom prst="straightConnector1">
+            <a:avLst/>
+          </a:prstGeom>
+          <a:ln w="19050" cap="flat" cmpd="sng" algn="ctr">
+            <a:solidFill>
+              <a:schemeClr val="bg2">
+                <a:lumMod val="50000"/>
+              </a:schemeClr>
+            </a:solidFill>
+            <a:prstDash val="solid"/>
+            <a:round/>
+            <a:headEnd type="arrow" w="med" len="med"/>
+            <a:tailEnd type="none" w="med" len="med"/>
+          </a:ln>
+        </p:spPr>
+        <p:style>
+          <a:lnRef idx="0">
+            <a:scrgbClr r="0" g="0" b="0"/>
+          </a:lnRef>
+          <a:fillRef idx="0">
+            <a:scrgbClr r="0" g="0" b="0"/>
+          </a:fillRef>
+          <a:effectRef idx="0">
+            <a:scrgbClr r="0" g="0" b="0"/>
+          </a:effectRef>
+          <a:fontRef idx="minor">
+            <a:schemeClr val="tx1"/>
+          </a:fontRef>
+        </p:style>
+      </p:cxnSp>
+      <p:cxnSp>
+        <p:nvCxnSpPr>
+          <p:cNvPr id="266" name="Straight Arrow Connector 29">
+            <a:extLst>
+              <a:ext uri="{FF2B5EF4-FFF2-40B4-BE49-F238E27FC236}">
+                <a16:creationId xmlns:a16="http://schemas.microsoft.com/office/drawing/2014/main" id="{154CA2BD-6BD0-7A6F-DA7F-83DF2251DD5E}"/>
+              </a:ext>
+            </a:extLst>
+          </p:cNvPr>
+          <p:cNvCxnSpPr>
+            <a:cxnSpLocks/>
+            <a:stCxn id="2" idx="1"/>
+            <a:endCxn id="260" idx="3"/>
+          </p:cNvCxnSpPr>
+          <p:nvPr/>
+        </p:nvCxnSpPr>
+        <p:spPr>
+          <a:xfrm flipH="1" flipV="1">
+            <a:off x="8016887" y="1384068"/>
+            <a:ext cx="1177114" cy="662856"/>
+          </a:xfrm>
+          <a:prstGeom prst="straightConnector1">
+            <a:avLst/>
+          </a:prstGeom>
+          <a:ln w="19050" cap="flat" cmpd="sng" algn="ctr">
+            <a:solidFill>
+              <a:schemeClr val="bg2">
+                <a:lumMod val="50000"/>
+              </a:schemeClr>
+            </a:solidFill>
+            <a:prstDash val="solid"/>
+            <a:round/>
+            <a:headEnd type="arrow" w="med" len="med"/>
+            <a:tailEnd type="none" w="med" len="med"/>
+          </a:ln>
+        </p:spPr>
+        <p:style>
+          <a:lnRef idx="0">
+            <a:scrgbClr r="0" g="0" b="0"/>
+          </a:lnRef>
+          <a:fillRef idx="0">
+            <a:scrgbClr r="0" g="0" b="0"/>
+          </a:fillRef>
+          <a:effectRef idx="0">
+            <a:scrgbClr r="0" g="0" b="0"/>
+          </a:effectRef>
+          <a:fontRef idx="minor">
+            <a:schemeClr val="tx1"/>
+          </a:fontRef>
+        </p:style>
+      </p:cxnSp>
+      <p:cxnSp>
+        <p:nvCxnSpPr>
+          <p:cNvPr id="269" name="Straight Arrow Connector 29">
+            <a:extLst>
+              <a:ext uri="{FF2B5EF4-FFF2-40B4-BE49-F238E27FC236}">
+                <a16:creationId xmlns:a16="http://schemas.microsoft.com/office/drawing/2014/main" id="{62E5D350-CDCC-7C85-11EE-E3FBBF601760}"/>
+              </a:ext>
+            </a:extLst>
+          </p:cNvPr>
+          <p:cNvCxnSpPr>
+            <a:cxnSpLocks/>
+            <a:stCxn id="33" idx="3"/>
+            <a:endCxn id="260" idx="3"/>
+          </p:cNvCxnSpPr>
+          <p:nvPr/>
+        </p:nvCxnSpPr>
+        <p:spPr>
+          <a:xfrm flipH="1" flipV="1">
+            <a:off x="8016887" y="1384068"/>
+            <a:ext cx="870154" cy="1835960"/>
+          </a:xfrm>
+          <a:prstGeom prst="straightConnector1">
+            <a:avLst/>
+          </a:prstGeom>
+          <a:ln w="19050" cap="flat" cmpd="sng" algn="ctr">
+            <a:solidFill>
+              <a:schemeClr val="bg2">
+                <a:lumMod val="50000"/>
+              </a:schemeClr>
+            </a:solidFill>
+            <a:prstDash val="solid"/>
+            <a:round/>
+            <a:headEnd type="arrow" w="med" len="med"/>
+            <a:tailEnd type="none" w="med" len="med"/>
+          </a:ln>
+        </p:spPr>
+        <p:style>
+          <a:lnRef idx="0">
+            <a:scrgbClr r="0" g="0" b="0"/>
+          </a:lnRef>
+          <a:fillRef idx="0">
+            <a:scrgbClr r="0" g="0" b="0"/>
+          </a:fillRef>
+          <a:effectRef idx="0">
+            <a:scrgbClr r="0" g="0" b="0"/>
+          </a:effectRef>
+          <a:fontRef idx="minor">
+            <a:schemeClr val="tx1"/>
+          </a:fontRef>
+        </p:style>
+      </p:cxnSp>
+    </p:spTree>
+    <p:extLst>
+      <p:ext uri="{BB962C8B-B14F-4D97-AF65-F5344CB8AC3E}">
+        <p14:creationId xmlns:p14="http://schemas.microsoft.com/office/powerpoint/2010/main" val="1676824193"/>
+      </p:ext>
+    </p:extLst>
+  </p:cSld>
+  <p:clrMapOvr>
+    <a:masterClrMapping/>
+  </p:clrMapOvr>
+</p:sld>
+</file>
+
 <file path=ppt/slides/slide2.xml><?xml version="1.0" encoding="utf-8"?>
 <p:sld xmlns:a="http://schemas.openxmlformats.org/drawingml/2006/main" xmlns:r="http://schemas.openxmlformats.org/officeDocument/2006/relationships" xmlns:p="http://schemas.openxmlformats.org/presentationml/2006/main">
   <p:cSld>
@@ -34789,8 +39134,8 @@
         </p:nvCxnSpPr>
         <p:spPr>
           <a:xfrm>
-            <a:off x="9402877" y="2447823"/>
-            <a:ext cx="8650" cy="1903316"/>
+            <a:off x="9408949" y="2447823"/>
+            <a:ext cx="2578" cy="1903316"/>
           </a:xfrm>
           <a:prstGeom prst="straightConnector1">
             <a:avLst/>
@@ -34840,8 +39185,8 @@
         </p:nvCxnSpPr>
         <p:spPr>
           <a:xfrm>
-            <a:off x="9402877" y="2447823"/>
-            <a:ext cx="1129846" cy="1903314"/>
+            <a:off x="9408949" y="2447823"/>
+            <a:ext cx="1123774" cy="1903314"/>
           </a:xfrm>
           <a:prstGeom prst="straightConnector1">
             <a:avLst/>
@@ -35193,66 +39538,6 @@
                 <a:schemeClr val="tx1"/>
               </a:solidFill>
             </a:endParaRPr>
-          </a:p>
-        </p:txBody>
-      </p:sp>
-      <p:sp>
-        <p:nvSpPr>
-          <p:cNvPr id="75" name="Scroll: Vertical 74">
-            <a:extLst>
-              <a:ext uri="{FF2B5EF4-FFF2-40B4-BE49-F238E27FC236}">
-                <a16:creationId xmlns:a16="http://schemas.microsoft.com/office/drawing/2014/main" id="{CAD8C807-F852-474E-9DCD-6C18ABBDE35E}"/>
-              </a:ext>
-            </a:extLst>
-          </p:cNvPr>
-          <p:cNvSpPr/>
-          <p:nvPr/>
-        </p:nvSpPr>
-        <p:spPr>
-          <a:xfrm rot="5400000">
-            <a:off x="3882133" y="3227408"/>
-            <a:ext cx="398326" cy="495579"/>
-          </a:xfrm>
-          <a:prstGeom prst="verticalScroll">
-            <a:avLst/>
-          </a:prstGeom>
-          <a:solidFill>
-            <a:schemeClr val="accent3">
-              <a:lumMod val="75000"/>
-            </a:schemeClr>
-          </a:solidFill>
-          <a:ln>
-            <a:solidFill>
-              <a:schemeClr val="tx1"/>
-            </a:solidFill>
-          </a:ln>
-        </p:spPr>
-        <p:style>
-          <a:lnRef idx="2">
-            <a:schemeClr val="accent1">
-              <a:shade val="50000"/>
-            </a:schemeClr>
-          </a:lnRef>
-          <a:fillRef idx="1">
-            <a:schemeClr val="accent1"/>
-          </a:fillRef>
-          <a:effectRef idx="0">
-            <a:schemeClr val="accent1"/>
-          </a:effectRef>
-          <a:fontRef idx="minor">
-            <a:schemeClr val="lt1"/>
-          </a:fontRef>
-        </p:style>
-        <p:txBody>
-          <a:bodyPr vert="vert270" rtlCol="0" anchor="ctr"/>
-          <a:lstStyle/>
-          <a:p>
-            <a:pPr algn="ctr"/>
-            <a:r>
-              <a:rPr lang="en-US" sz="1200" dirty="0"/>
-              <a:t>JWT</a:t>
-            </a:r>
-            <a:endParaRPr lang="en-NZ" sz="800" dirty="0"/>
           </a:p>
         </p:txBody>
       </p:sp>
@@ -38461,9 +42746,9 @@
         <p:grpSpPr>
           <a:xfrm>
             <a:off x="8872325" y="2142999"/>
-            <a:ext cx="1061103" cy="304824"/>
+            <a:ext cx="1073247" cy="304824"/>
             <a:chOff x="8868697" y="1695584"/>
-            <a:chExt cx="1061103" cy="304824"/>
+            <a:chExt cx="1073247" cy="304824"/>
           </a:xfrm>
         </p:grpSpPr>
         <p:sp>
@@ -38481,7 +42766,7 @@
           <p:spPr>
             <a:xfrm>
               <a:off x="8868697" y="1695584"/>
-              <a:ext cx="1061103" cy="304824"/>
+              <a:ext cx="1073247" cy="304824"/>
             </a:xfrm>
             <a:prstGeom prst="roundRect">
               <a:avLst>
@@ -38521,7 +42806,7 @@
             <a:p>
               <a:pPr algn="r"/>
               <a:r>
-                <a:rPr lang="en-NZ" sz="1100" dirty="0"/>
+                <a:rPr lang="en-NZ" sz="1000" dirty="0"/>
                 <a:t>CloudWatch</a:t>
               </a:r>
               <a:endParaRPr lang="en-NZ" sz="1600" dirty="0"/>
@@ -39998,7 +44283,7 @@
                 <a:t>S3 </a:t>
               </a:r>
               <a:r>
-                <a:rPr lang="en-US" sz="800" dirty="0">
+                <a:rPr lang="en-US" sz="700" dirty="0">
                   <a:solidFill>
                     <a:schemeClr val="tx1"/>
                   </a:solidFill>

</xml_diff>